<commit_message>
Updated Azure Container Instance explanation
</commit_message>
<xml_diff>
--- a/Business Central on a Docker Image.pptx
+++ b/Business Central on a Docker Image.pptx
@@ -5,7 +5,7 @@
     <p:sldMasterId id="2147483658" r:id="rId1"/>
   </p:sldMasterIdLst>
   <p:notesMasterIdLst>
-    <p:notesMasterId r:id="rId107"/>
+    <p:notesMasterId r:id="rId112"/>
   </p:notesMasterIdLst>
   <p:sldIdLst>
     <p:sldId id="256" r:id="rId2"/>
@@ -111,34 +111,39 @@
     <p:sldId id="285" r:id="rId102"/>
     <p:sldId id="290" r:id="rId103"/>
     <p:sldId id="319" r:id="rId104"/>
-    <p:sldId id="280" r:id="rId105"/>
-    <p:sldId id="302" r:id="rId106"/>
+    <p:sldId id="407" r:id="rId105"/>
+    <p:sldId id="408" r:id="rId106"/>
+    <p:sldId id="409" r:id="rId107"/>
+    <p:sldId id="411" r:id="rId108"/>
+    <p:sldId id="410" r:id="rId109"/>
+    <p:sldId id="280" r:id="rId110"/>
+    <p:sldId id="302" r:id="rId111"/>
   </p:sldIdLst>
   <p:sldSz cx="9144000" cy="6858000" type="screen4x3"/>
   <p:notesSz cx="6858000" cy="9144000"/>
   <p:embeddedFontLst>
     <p:embeddedFont>
       <p:font typeface="Calibri" panose="020F0502020204030204" pitchFamily="34" charset="0"/>
-      <p:regular r:id="rId108"/>
-      <p:bold r:id="rId109"/>
-      <p:italic r:id="rId110"/>
-      <p:boldItalic r:id="rId111"/>
+      <p:regular r:id="rId113"/>
+      <p:bold r:id="rId114"/>
+      <p:italic r:id="rId115"/>
+      <p:boldItalic r:id="rId116"/>
     </p:embeddedFont>
     <p:embeddedFont>
       <p:font typeface="Lucida Console" panose="020B0609040504020204" pitchFamily="49" charset="0"/>
-      <p:regular r:id="rId112"/>
+      <p:regular r:id="rId117"/>
     </p:embeddedFont>
     <p:embeddedFont>
       <p:font typeface="Roboto Slab" panose="020B0604020202020204" charset="0"/>
-      <p:regular r:id="rId113"/>
-      <p:bold r:id="rId114"/>
+      <p:regular r:id="rId118"/>
+      <p:bold r:id="rId119"/>
     </p:embeddedFont>
     <p:embeddedFont>
       <p:font typeface="Source Sans Pro" panose="020B0503030403020204" pitchFamily="34" charset="0"/>
-      <p:regular r:id="rId115"/>
-      <p:bold r:id="rId116"/>
-      <p:italic r:id="rId117"/>
-      <p:boldItalic r:id="rId118"/>
+      <p:regular r:id="rId120"/>
+      <p:bold r:id="rId121"/>
+      <p:italic r:id="rId122"/>
+      <p:boldItalic r:id="rId123"/>
     </p:embeddedFont>
   </p:embeddedFontLst>
   <p:defaultTextStyle>
@@ -1578,7 +1583,7 @@
   <p:cSld>
     <p:spTree>
       <p:nvGrpSpPr>
-        <p:cNvPr id="1" name="Shape 371"/>
+        <p:cNvPr id="1" name="Shape 106"/>
         <p:cNvGrpSpPr/>
         <p:nvPr/>
       </p:nvGrpSpPr>
@@ -1592,7 +1597,7 @@
       </p:grpSpPr>
       <p:sp>
         <p:nvSpPr>
-          <p:cNvPr id="372" name="Google Shape;372;g35ed75ccf_022:notes"/>
+          <p:cNvPr id="107" name="Google Shape;107;p:notes"/>
           <p:cNvSpPr>
             <a:spLocks noGrp="1" noRot="1" noChangeAspect="1"/>
           </p:cNvSpPr>
@@ -1633,7 +1638,7 @@
       </p:sp>
       <p:sp>
         <p:nvSpPr>
-          <p:cNvPr id="373" name="Google Shape;373;g35ed75ccf_022:notes"/>
+          <p:cNvPr id="108" name="Google Shape;108;p:notes"/>
           <p:cNvSpPr txBox="1">
             <a:spLocks noGrp="1"/>
           </p:cNvSpPr>
@@ -1670,6 +1675,11 @@
         </p:txBody>
       </p:sp>
     </p:spTree>
+    <p:extLst>
+      <p:ext uri="{BB962C8B-B14F-4D97-AF65-F5344CB8AC3E}">
+        <p14:creationId xmlns:p14="http://schemas.microsoft.com/office/powerpoint/2010/main" val="3292665753"/>
+      </p:ext>
+    </p:extLst>
   </p:cSld>
   <p:clrMapOvr>
     <a:masterClrMapping/>
@@ -1682,7 +1692,7 @@
   <p:cSld>
     <p:spTree>
       <p:nvGrpSpPr>
-        <p:cNvPr id="1" name="Shape 145"/>
+        <p:cNvPr id="1" name="Shape 106"/>
         <p:cNvGrpSpPr/>
         <p:nvPr/>
       </p:nvGrpSpPr>
@@ -1696,7 +1706,7 @@
       </p:grpSpPr>
       <p:sp>
         <p:nvSpPr>
-          <p:cNvPr id="146" name="Google Shape;146;g35f391192_057:notes"/>
+          <p:cNvPr id="107" name="Google Shape;107;p:notes"/>
           <p:cNvSpPr>
             <a:spLocks noGrp="1" noRot="1" noChangeAspect="1"/>
           </p:cNvSpPr>
@@ -1737,7 +1747,7 @@
       </p:sp>
       <p:sp>
         <p:nvSpPr>
-          <p:cNvPr id="147" name="Google Shape;147;g35f391192_057:notes"/>
+          <p:cNvPr id="108" name="Google Shape;108;p:notes"/>
           <p:cNvSpPr txBox="1">
             <a:spLocks noGrp="1"/>
           </p:cNvSpPr>
@@ -1776,9 +1786,440 @@
     </p:spTree>
     <p:extLst>
       <p:ext uri="{BB962C8B-B14F-4D97-AF65-F5344CB8AC3E}">
-        <p14:creationId xmlns:p14="http://schemas.microsoft.com/office/powerpoint/2010/main" val="1388372576"/>
+        <p14:creationId xmlns:p14="http://schemas.microsoft.com/office/powerpoint/2010/main" val="2242203046"/>
       </p:ext>
     </p:extLst>
+  </p:cSld>
+  <p:clrMapOvr>
+    <a:masterClrMapping/>
+  </p:clrMapOvr>
+</p:notes>
+</file>
+
+<file path=ppt/notesSlides/notesSlide106.xml><?xml version="1.0" encoding="utf-8"?>
+<p:notes xmlns:a="http://schemas.openxmlformats.org/drawingml/2006/main" xmlns:r="http://schemas.openxmlformats.org/officeDocument/2006/relationships" xmlns:p="http://schemas.openxmlformats.org/presentationml/2006/main" showMasterSp="0" showMasterPhAnim="0">
+  <p:cSld>
+    <p:spTree>
+      <p:nvGrpSpPr>
+        <p:cNvPr id="1" name="Shape 106"/>
+        <p:cNvGrpSpPr/>
+        <p:nvPr/>
+      </p:nvGrpSpPr>
+      <p:grpSpPr>
+        <a:xfrm>
+          <a:off x="0" y="0"/>
+          <a:ext cx="0" cy="0"/>
+          <a:chOff x="0" y="0"/>
+          <a:chExt cx="0" cy="0"/>
+        </a:xfrm>
+      </p:grpSpPr>
+      <p:sp>
+        <p:nvSpPr>
+          <p:cNvPr id="107" name="Google Shape;107;p:notes"/>
+          <p:cNvSpPr>
+            <a:spLocks noGrp="1" noRot="1" noChangeAspect="1"/>
+          </p:cNvSpPr>
+          <p:nvPr>
+            <p:ph type="sldImg" idx="2"/>
+          </p:nvPr>
+        </p:nvSpPr>
+        <p:spPr>
+          <a:xfrm>
+            <a:off x="1143000" y="685800"/>
+            <a:ext cx="4572000" cy="3429000"/>
+          </a:xfrm>
+          <a:custGeom>
+            <a:avLst/>
+            <a:gdLst/>
+            <a:ahLst/>
+            <a:cxnLst/>
+            <a:rect l="l" t="t" r="r" b="b"/>
+            <a:pathLst>
+              <a:path w="120000" h="120000" extrusionOk="0">
+                <a:moveTo>
+                  <a:pt x="0" y="0"/>
+                </a:moveTo>
+                <a:lnTo>
+                  <a:pt x="120000" y="0"/>
+                </a:lnTo>
+                <a:lnTo>
+                  <a:pt x="120000" y="120000"/>
+                </a:lnTo>
+                <a:lnTo>
+                  <a:pt x="0" y="120000"/>
+                </a:lnTo>
+                <a:close/>
+              </a:path>
+            </a:pathLst>
+          </a:custGeom>
+        </p:spPr>
+      </p:sp>
+      <p:sp>
+        <p:nvSpPr>
+          <p:cNvPr id="108" name="Google Shape;108;p:notes"/>
+          <p:cNvSpPr txBox="1">
+            <a:spLocks noGrp="1"/>
+          </p:cNvSpPr>
+          <p:nvPr>
+            <p:ph type="body" idx="1"/>
+          </p:nvPr>
+        </p:nvSpPr>
+        <p:spPr>
+          <a:xfrm>
+            <a:off x="685800" y="4343400"/>
+            <a:ext cx="5486400" cy="4114800"/>
+          </a:xfrm>
+          <a:prstGeom prst="rect">
+            <a:avLst/>
+          </a:prstGeom>
+        </p:spPr>
+        <p:txBody>
+          <a:bodyPr spcFirstLastPara="1" wrap="square" lIns="91425" tIns="91425" rIns="91425" bIns="91425" anchor="t" anchorCtr="0">
+            <a:noAutofit/>
+          </a:bodyPr>
+          <a:lstStyle/>
+          <a:p>
+            <a:pPr marL="0" lvl="0" indent="0" algn="l" rtl="0">
+              <a:spcBef>
+                <a:spcPts val="0"/>
+              </a:spcBef>
+              <a:spcAft>
+                <a:spcPts val="0"/>
+              </a:spcAft>
+              <a:buNone/>
+            </a:pPr>
+            <a:endParaRPr/>
+          </a:p>
+        </p:txBody>
+      </p:sp>
+    </p:spTree>
+    <p:extLst>
+      <p:ext uri="{BB962C8B-B14F-4D97-AF65-F5344CB8AC3E}">
+        <p14:creationId xmlns:p14="http://schemas.microsoft.com/office/powerpoint/2010/main" val="2369638337"/>
+      </p:ext>
+    </p:extLst>
+  </p:cSld>
+  <p:clrMapOvr>
+    <a:masterClrMapping/>
+  </p:clrMapOvr>
+</p:notes>
+</file>
+
+<file path=ppt/notesSlides/notesSlide107.xml><?xml version="1.0" encoding="utf-8"?>
+<p:notes xmlns:a="http://schemas.openxmlformats.org/drawingml/2006/main" xmlns:r="http://schemas.openxmlformats.org/officeDocument/2006/relationships" xmlns:p="http://schemas.openxmlformats.org/presentationml/2006/main" showMasterSp="0" showMasterPhAnim="0">
+  <p:cSld>
+    <p:spTree>
+      <p:nvGrpSpPr>
+        <p:cNvPr id="1" name="Shape 106"/>
+        <p:cNvGrpSpPr/>
+        <p:nvPr/>
+      </p:nvGrpSpPr>
+      <p:grpSpPr>
+        <a:xfrm>
+          <a:off x="0" y="0"/>
+          <a:ext cx="0" cy="0"/>
+          <a:chOff x="0" y="0"/>
+          <a:chExt cx="0" cy="0"/>
+        </a:xfrm>
+      </p:grpSpPr>
+      <p:sp>
+        <p:nvSpPr>
+          <p:cNvPr id="107" name="Google Shape;107;p:notes"/>
+          <p:cNvSpPr>
+            <a:spLocks noGrp="1" noRot="1" noChangeAspect="1"/>
+          </p:cNvSpPr>
+          <p:nvPr>
+            <p:ph type="sldImg" idx="2"/>
+          </p:nvPr>
+        </p:nvSpPr>
+        <p:spPr>
+          <a:xfrm>
+            <a:off x="1143000" y="685800"/>
+            <a:ext cx="4572000" cy="3429000"/>
+          </a:xfrm>
+          <a:custGeom>
+            <a:avLst/>
+            <a:gdLst/>
+            <a:ahLst/>
+            <a:cxnLst/>
+            <a:rect l="l" t="t" r="r" b="b"/>
+            <a:pathLst>
+              <a:path w="120000" h="120000" extrusionOk="0">
+                <a:moveTo>
+                  <a:pt x="0" y="0"/>
+                </a:moveTo>
+                <a:lnTo>
+                  <a:pt x="120000" y="0"/>
+                </a:lnTo>
+                <a:lnTo>
+                  <a:pt x="120000" y="120000"/>
+                </a:lnTo>
+                <a:lnTo>
+                  <a:pt x="0" y="120000"/>
+                </a:lnTo>
+                <a:close/>
+              </a:path>
+            </a:pathLst>
+          </a:custGeom>
+        </p:spPr>
+      </p:sp>
+      <p:sp>
+        <p:nvSpPr>
+          <p:cNvPr id="108" name="Google Shape;108;p:notes"/>
+          <p:cNvSpPr txBox="1">
+            <a:spLocks noGrp="1"/>
+          </p:cNvSpPr>
+          <p:nvPr>
+            <p:ph type="body" idx="1"/>
+          </p:nvPr>
+        </p:nvSpPr>
+        <p:spPr>
+          <a:xfrm>
+            <a:off x="685800" y="4343400"/>
+            <a:ext cx="5486400" cy="4114800"/>
+          </a:xfrm>
+          <a:prstGeom prst="rect">
+            <a:avLst/>
+          </a:prstGeom>
+        </p:spPr>
+        <p:txBody>
+          <a:bodyPr spcFirstLastPara="1" wrap="square" lIns="91425" tIns="91425" rIns="91425" bIns="91425" anchor="t" anchorCtr="0">
+            <a:noAutofit/>
+          </a:bodyPr>
+          <a:lstStyle/>
+          <a:p>
+            <a:pPr marL="0" lvl="0" indent="0" algn="l" rtl="0">
+              <a:spcBef>
+                <a:spcPts val="0"/>
+              </a:spcBef>
+              <a:spcAft>
+                <a:spcPts val="0"/>
+              </a:spcAft>
+              <a:buNone/>
+            </a:pPr>
+            <a:endParaRPr/>
+          </a:p>
+        </p:txBody>
+      </p:sp>
+    </p:spTree>
+    <p:extLst>
+      <p:ext uri="{BB962C8B-B14F-4D97-AF65-F5344CB8AC3E}">
+        <p14:creationId xmlns:p14="http://schemas.microsoft.com/office/powerpoint/2010/main" val="2023453891"/>
+      </p:ext>
+    </p:extLst>
+  </p:cSld>
+  <p:clrMapOvr>
+    <a:masterClrMapping/>
+  </p:clrMapOvr>
+</p:notes>
+</file>
+
+<file path=ppt/notesSlides/notesSlide108.xml><?xml version="1.0" encoding="utf-8"?>
+<p:notes xmlns:a="http://schemas.openxmlformats.org/drawingml/2006/main" xmlns:r="http://schemas.openxmlformats.org/officeDocument/2006/relationships" xmlns:p="http://schemas.openxmlformats.org/presentationml/2006/main" showMasterSp="0" showMasterPhAnim="0">
+  <p:cSld>
+    <p:spTree>
+      <p:nvGrpSpPr>
+        <p:cNvPr id="1" name="Shape 106"/>
+        <p:cNvGrpSpPr/>
+        <p:nvPr/>
+      </p:nvGrpSpPr>
+      <p:grpSpPr>
+        <a:xfrm>
+          <a:off x="0" y="0"/>
+          <a:ext cx="0" cy="0"/>
+          <a:chOff x="0" y="0"/>
+          <a:chExt cx="0" cy="0"/>
+        </a:xfrm>
+      </p:grpSpPr>
+      <p:sp>
+        <p:nvSpPr>
+          <p:cNvPr id="107" name="Google Shape;107;p:notes"/>
+          <p:cNvSpPr>
+            <a:spLocks noGrp="1" noRot="1" noChangeAspect="1"/>
+          </p:cNvSpPr>
+          <p:nvPr>
+            <p:ph type="sldImg" idx="2"/>
+          </p:nvPr>
+        </p:nvSpPr>
+        <p:spPr>
+          <a:xfrm>
+            <a:off x="1143000" y="685800"/>
+            <a:ext cx="4572000" cy="3429000"/>
+          </a:xfrm>
+          <a:custGeom>
+            <a:avLst/>
+            <a:gdLst/>
+            <a:ahLst/>
+            <a:cxnLst/>
+            <a:rect l="l" t="t" r="r" b="b"/>
+            <a:pathLst>
+              <a:path w="120000" h="120000" extrusionOk="0">
+                <a:moveTo>
+                  <a:pt x="0" y="0"/>
+                </a:moveTo>
+                <a:lnTo>
+                  <a:pt x="120000" y="0"/>
+                </a:lnTo>
+                <a:lnTo>
+                  <a:pt x="120000" y="120000"/>
+                </a:lnTo>
+                <a:lnTo>
+                  <a:pt x="0" y="120000"/>
+                </a:lnTo>
+                <a:close/>
+              </a:path>
+            </a:pathLst>
+          </a:custGeom>
+        </p:spPr>
+      </p:sp>
+      <p:sp>
+        <p:nvSpPr>
+          <p:cNvPr id="108" name="Google Shape;108;p:notes"/>
+          <p:cNvSpPr txBox="1">
+            <a:spLocks noGrp="1"/>
+          </p:cNvSpPr>
+          <p:nvPr>
+            <p:ph type="body" idx="1"/>
+          </p:nvPr>
+        </p:nvSpPr>
+        <p:spPr>
+          <a:xfrm>
+            <a:off x="685800" y="4343400"/>
+            <a:ext cx="5486400" cy="4114800"/>
+          </a:xfrm>
+          <a:prstGeom prst="rect">
+            <a:avLst/>
+          </a:prstGeom>
+        </p:spPr>
+        <p:txBody>
+          <a:bodyPr spcFirstLastPara="1" wrap="square" lIns="91425" tIns="91425" rIns="91425" bIns="91425" anchor="t" anchorCtr="0">
+            <a:noAutofit/>
+          </a:bodyPr>
+          <a:lstStyle/>
+          <a:p>
+            <a:pPr marL="0" lvl="0" indent="0" algn="l" rtl="0">
+              <a:spcBef>
+                <a:spcPts val="0"/>
+              </a:spcBef>
+              <a:spcAft>
+                <a:spcPts val="0"/>
+              </a:spcAft>
+              <a:buNone/>
+            </a:pPr>
+            <a:endParaRPr/>
+          </a:p>
+        </p:txBody>
+      </p:sp>
+    </p:spTree>
+    <p:extLst>
+      <p:ext uri="{BB962C8B-B14F-4D97-AF65-F5344CB8AC3E}">
+        <p14:creationId xmlns:p14="http://schemas.microsoft.com/office/powerpoint/2010/main" val="1030930700"/>
+      </p:ext>
+    </p:extLst>
+  </p:cSld>
+  <p:clrMapOvr>
+    <a:masterClrMapping/>
+  </p:clrMapOvr>
+</p:notes>
+</file>
+
+<file path=ppt/notesSlides/notesSlide109.xml><?xml version="1.0" encoding="utf-8"?>
+<p:notes xmlns:a="http://schemas.openxmlformats.org/drawingml/2006/main" xmlns:r="http://schemas.openxmlformats.org/officeDocument/2006/relationships" xmlns:p="http://schemas.openxmlformats.org/presentationml/2006/main" showMasterSp="0" showMasterPhAnim="0">
+  <p:cSld>
+    <p:spTree>
+      <p:nvGrpSpPr>
+        <p:cNvPr id="1" name="Shape 371"/>
+        <p:cNvGrpSpPr/>
+        <p:nvPr/>
+      </p:nvGrpSpPr>
+      <p:grpSpPr>
+        <a:xfrm>
+          <a:off x="0" y="0"/>
+          <a:ext cx="0" cy="0"/>
+          <a:chOff x="0" y="0"/>
+          <a:chExt cx="0" cy="0"/>
+        </a:xfrm>
+      </p:grpSpPr>
+      <p:sp>
+        <p:nvSpPr>
+          <p:cNvPr id="372" name="Google Shape;372;g35ed75ccf_022:notes"/>
+          <p:cNvSpPr>
+            <a:spLocks noGrp="1" noRot="1" noChangeAspect="1"/>
+          </p:cNvSpPr>
+          <p:nvPr>
+            <p:ph type="sldImg" idx="2"/>
+          </p:nvPr>
+        </p:nvSpPr>
+        <p:spPr>
+          <a:xfrm>
+            <a:off x="1143000" y="685800"/>
+            <a:ext cx="4572000" cy="3429000"/>
+          </a:xfrm>
+          <a:custGeom>
+            <a:avLst/>
+            <a:gdLst/>
+            <a:ahLst/>
+            <a:cxnLst/>
+            <a:rect l="l" t="t" r="r" b="b"/>
+            <a:pathLst>
+              <a:path w="120000" h="120000" extrusionOk="0">
+                <a:moveTo>
+                  <a:pt x="0" y="0"/>
+                </a:moveTo>
+                <a:lnTo>
+                  <a:pt x="120000" y="0"/>
+                </a:lnTo>
+                <a:lnTo>
+                  <a:pt x="120000" y="120000"/>
+                </a:lnTo>
+                <a:lnTo>
+                  <a:pt x="0" y="120000"/>
+                </a:lnTo>
+                <a:close/>
+              </a:path>
+            </a:pathLst>
+          </a:custGeom>
+        </p:spPr>
+      </p:sp>
+      <p:sp>
+        <p:nvSpPr>
+          <p:cNvPr id="373" name="Google Shape;373;g35ed75ccf_022:notes"/>
+          <p:cNvSpPr txBox="1">
+            <a:spLocks noGrp="1"/>
+          </p:cNvSpPr>
+          <p:nvPr>
+            <p:ph type="body" idx="1"/>
+          </p:nvPr>
+        </p:nvSpPr>
+        <p:spPr>
+          <a:xfrm>
+            <a:off x="685800" y="4343400"/>
+            <a:ext cx="5486400" cy="4114800"/>
+          </a:xfrm>
+          <a:prstGeom prst="rect">
+            <a:avLst/>
+          </a:prstGeom>
+        </p:spPr>
+        <p:txBody>
+          <a:bodyPr spcFirstLastPara="1" wrap="square" lIns="91425" tIns="91425" rIns="91425" bIns="91425" anchor="t" anchorCtr="0">
+            <a:noAutofit/>
+          </a:bodyPr>
+          <a:lstStyle/>
+          <a:p>
+            <a:pPr marL="0" lvl="0" indent="0" algn="l" rtl="0">
+              <a:spcBef>
+                <a:spcPts val="0"/>
+              </a:spcBef>
+              <a:spcAft>
+                <a:spcPts val="0"/>
+              </a:spcAft>
+              <a:buNone/>
+            </a:pPr>
+            <a:endParaRPr/>
+          </a:p>
+        </p:txBody>
+      </p:sp>
+    </p:spTree>
   </p:cSld>
   <p:clrMapOvr>
     <a:masterClrMapping/>
@@ -1886,6 +2327,115 @@
     <p:extLst>
       <p:ext uri="{BB962C8B-B14F-4D97-AF65-F5344CB8AC3E}">
         <p14:creationId xmlns:p14="http://schemas.microsoft.com/office/powerpoint/2010/main" val="2943706369"/>
+      </p:ext>
+    </p:extLst>
+  </p:cSld>
+  <p:clrMapOvr>
+    <a:masterClrMapping/>
+  </p:clrMapOvr>
+</p:notes>
+</file>
+
+<file path=ppt/notesSlides/notesSlide110.xml><?xml version="1.0" encoding="utf-8"?>
+<p:notes xmlns:a="http://schemas.openxmlformats.org/drawingml/2006/main" xmlns:r="http://schemas.openxmlformats.org/officeDocument/2006/relationships" xmlns:p="http://schemas.openxmlformats.org/presentationml/2006/main" showMasterSp="0" showMasterPhAnim="0">
+  <p:cSld>
+    <p:spTree>
+      <p:nvGrpSpPr>
+        <p:cNvPr id="1" name="Shape 145"/>
+        <p:cNvGrpSpPr/>
+        <p:nvPr/>
+      </p:nvGrpSpPr>
+      <p:grpSpPr>
+        <a:xfrm>
+          <a:off x="0" y="0"/>
+          <a:ext cx="0" cy="0"/>
+          <a:chOff x="0" y="0"/>
+          <a:chExt cx="0" cy="0"/>
+        </a:xfrm>
+      </p:grpSpPr>
+      <p:sp>
+        <p:nvSpPr>
+          <p:cNvPr id="146" name="Google Shape;146;g35f391192_057:notes"/>
+          <p:cNvSpPr>
+            <a:spLocks noGrp="1" noRot="1" noChangeAspect="1"/>
+          </p:cNvSpPr>
+          <p:nvPr>
+            <p:ph type="sldImg" idx="2"/>
+          </p:nvPr>
+        </p:nvSpPr>
+        <p:spPr>
+          <a:xfrm>
+            <a:off x="1143000" y="685800"/>
+            <a:ext cx="4572000" cy="3429000"/>
+          </a:xfrm>
+          <a:custGeom>
+            <a:avLst/>
+            <a:gdLst/>
+            <a:ahLst/>
+            <a:cxnLst/>
+            <a:rect l="l" t="t" r="r" b="b"/>
+            <a:pathLst>
+              <a:path w="120000" h="120000" extrusionOk="0">
+                <a:moveTo>
+                  <a:pt x="0" y="0"/>
+                </a:moveTo>
+                <a:lnTo>
+                  <a:pt x="120000" y="0"/>
+                </a:lnTo>
+                <a:lnTo>
+                  <a:pt x="120000" y="120000"/>
+                </a:lnTo>
+                <a:lnTo>
+                  <a:pt x="0" y="120000"/>
+                </a:lnTo>
+                <a:close/>
+              </a:path>
+            </a:pathLst>
+          </a:custGeom>
+        </p:spPr>
+      </p:sp>
+      <p:sp>
+        <p:nvSpPr>
+          <p:cNvPr id="147" name="Google Shape;147;g35f391192_057:notes"/>
+          <p:cNvSpPr txBox="1">
+            <a:spLocks noGrp="1"/>
+          </p:cNvSpPr>
+          <p:nvPr>
+            <p:ph type="body" idx="1"/>
+          </p:nvPr>
+        </p:nvSpPr>
+        <p:spPr>
+          <a:xfrm>
+            <a:off x="685800" y="4343400"/>
+            <a:ext cx="5486400" cy="4114800"/>
+          </a:xfrm>
+          <a:prstGeom prst="rect">
+            <a:avLst/>
+          </a:prstGeom>
+        </p:spPr>
+        <p:txBody>
+          <a:bodyPr spcFirstLastPara="1" wrap="square" lIns="91425" tIns="91425" rIns="91425" bIns="91425" anchor="t" anchorCtr="0">
+            <a:noAutofit/>
+          </a:bodyPr>
+          <a:lstStyle/>
+          <a:p>
+            <a:pPr marL="0" lvl="0" indent="0" algn="l" rtl="0">
+              <a:spcBef>
+                <a:spcPts val="0"/>
+              </a:spcBef>
+              <a:spcAft>
+                <a:spcPts val="0"/>
+              </a:spcAft>
+              <a:buNone/>
+            </a:pPr>
+            <a:endParaRPr/>
+          </a:p>
+        </p:txBody>
+      </p:sp>
+    </p:spTree>
+    <p:extLst>
+      <p:ext uri="{BB962C8B-B14F-4D97-AF65-F5344CB8AC3E}">
+        <p14:creationId xmlns:p14="http://schemas.microsoft.com/office/powerpoint/2010/main" val="1388372576"/>
       </p:ext>
     </p:extLst>
   </p:cSld>
@@ -18222,6 +18772,965 @@
   <p:cSld>
     <p:spTree>
       <p:nvGrpSpPr>
+        <p:cNvPr id="1" name="Shape 109"/>
+        <p:cNvGrpSpPr/>
+        <p:nvPr/>
+      </p:nvGrpSpPr>
+      <p:grpSpPr>
+        <a:xfrm>
+          <a:off x="0" y="0"/>
+          <a:ext cx="0" cy="0"/>
+          <a:chOff x="0" y="0"/>
+          <a:chExt cx="0" cy="0"/>
+        </a:xfrm>
+      </p:grpSpPr>
+      <p:sp>
+        <p:nvSpPr>
+          <p:cNvPr id="110" name="Google Shape;110;p17"/>
+          <p:cNvSpPr txBox="1">
+            <a:spLocks noGrp="1"/>
+          </p:cNvSpPr>
+          <p:nvPr>
+            <p:ph type="title"/>
+          </p:nvPr>
+        </p:nvSpPr>
+        <p:spPr>
+          <a:xfrm>
+            <a:off x="786150" y="410826"/>
+            <a:ext cx="7571700" cy="936900"/>
+          </a:xfrm>
+          <a:prstGeom prst="rect">
+            <a:avLst/>
+          </a:prstGeom>
+        </p:spPr>
+        <p:txBody>
+          <a:bodyPr spcFirstLastPara="1" wrap="square" lIns="91425" tIns="91425" rIns="91425" bIns="91425" anchor="b" anchorCtr="0">
+            <a:noAutofit/>
+          </a:bodyPr>
+          <a:lstStyle/>
+          <a:p>
+            <a:pPr marL="0" lvl="0" indent="0" algn="l" rtl="0">
+              <a:spcBef>
+                <a:spcPts val="0"/>
+              </a:spcBef>
+              <a:spcAft>
+                <a:spcPts val="0"/>
+              </a:spcAft>
+              <a:buNone/>
+            </a:pPr>
+            <a:r>
+              <a:rPr lang="en-US" dirty="0"/>
+              <a:t>Azure Container Instance</a:t>
+            </a:r>
+            <a:endParaRPr dirty="0"/>
+          </a:p>
+        </p:txBody>
+      </p:sp>
+      <p:sp>
+        <p:nvSpPr>
+          <p:cNvPr id="111" name="Google Shape;111;p17"/>
+          <p:cNvSpPr txBox="1">
+            <a:spLocks noGrp="1"/>
+          </p:cNvSpPr>
+          <p:nvPr>
+            <p:ph type="body" idx="1"/>
+          </p:nvPr>
+        </p:nvSpPr>
+        <p:spPr>
+          <a:xfrm>
+            <a:off x="786150" y="1682267"/>
+            <a:ext cx="7571700" cy="4764900"/>
+          </a:xfrm>
+          <a:prstGeom prst="rect">
+            <a:avLst/>
+          </a:prstGeom>
+        </p:spPr>
+        <p:txBody>
+          <a:bodyPr spcFirstLastPara="1" wrap="square" lIns="91425" tIns="91425" rIns="91425" bIns="91425" anchor="t" anchorCtr="0">
+            <a:noAutofit/>
+          </a:bodyPr>
+          <a:lstStyle/>
+          <a:p>
+            <a:pPr marL="38100" lvl="0" indent="0">
+              <a:buNone/>
+            </a:pPr>
+            <a:r>
+              <a:rPr lang="en-US" dirty="0"/>
+              <a:t>Create an Azure account and log in to portal.azure.com</a:t>
+            </a:r>
+          </a:p>
+          <a:p>
+            <a:pPr marL="38100" lvl="0" indent="0">
+              <a:buNone/>
+            </a:pPr>
+            <a:endParaRPr lang="en-US" dirty="0"/>
+          </a:p>
+          <a:p>
+            <a:pPr marL="38100" lvl="0" indent="0">
+              <a:buNone/>
+            </a:pPr>
+            <a:r>
+              <a:rPr lang="en-US" dirty="0"/>
+              <a:t>Open an Azure Cloud Shell in the top navigation pane.</a:t>
+            </a:r>
+          </a:p>
+        </p:txBody>
+      </p:sp>
+      <p:sp>
+        <p:nvSpPr>
+          <p:cNvPr id="112" name="Google Shape;112;p17"/>
+          <p:cNvSpPr txBox="1">
+            <a:spLocks noGrp="1"/>
+          </p:cNvSpPr>
+          <p:nvPr>
+            <p:ph type="sldNum" idx="12"/>
+          </p:nvPr>
+        </p:nvSpPr>
+        <p:spPr>
+          <a:xfrm>
+            <a:off x="8404384" y="6333134"/>
+            <a:ext cx="548700" cy="525000"/>
+          </a:xfrm>
+          <a:prstGeom prst="rect">
+            <a:avLst/>
+          </a:prstGeom>
+        </p:spPr>
+        <p:txBody>
+          <a:bodyPr spcFirstLastPara="1" wrap="square" lIns="91425" tIns="91425" rIns="91425" bIns="91425" anchor="t" anchorCtr="0">
+            <a:noAutofit/>
+          </a:bodyPr>
+          <a:lstStyle/>
+          <a:p>
+            <a:pPr marL="0" lvl="0" indent="0" algn="r" rtl="0">
+              <a:spcBef>
+                <a:spcPts val="0"/>
+              </a:spcBef>
+              <a:spcAft>
+                <a:spcPts val="0"/>
+              </a:spcAft>
+              <a:buNone/>
+            </a:pPr>
+            <a:fld id="{00000000-1234-1234-1234-123412341234}" type="slidenum">
+              <a:rPr lang="en"/>
+              <a:t>104</a:t>
+            </a:fld>
+            <a:endParaRPr/>
+          </a:p>
+        </p:txBody>
+      </p:sp>
+    </p:spTree>
+    <p:extLst>
+      <p:ext uri="{BB962C8B-B14F-4D97-AF65-F5344CB8AC3E}">
+        <p14:creationId xmlns:p14="http://schemas.microsoft.com/office/powerpoint/2010/main" val="1038102806"/>
+      </p:ext>
+    </p:extLst>
+  </p:cSld>
+  <p:clrMapOvr>
+    <a:masterClrMapping/>
+  </p:clrMapOvr>
+</p:sld>
+</file>
+
+<file path=ppt/slides/slide105.xml><?xml version="1.0" encoding="utf-8"?>
+<p:sld xmlns:a="http://schemas.openxmlformats.org/drawingml/2006/main" xmlns:r="http://schemas.openxmlformats.org/officeDocument/2006/relationships" xmlns:p="http://schemas.openxmlformats.org/presentationml/2006/main">
+  <p:cSld>
+    <p:spTree>
+      <p:nvGrpSpPr>
+        <p:cNvPr id="1" name="Shape 109"/>
+        <p:cNvGrpSpPr/>
+        <p:nvPr/>
+      </p:nvGrpSpPr>
+      <p:grpSpPr>
+        <a:xfrm>
+          <a:off x="0" y="0"/>
+          <a:ext cx="0" cy="0"/>
+          <a:chOff x="0" y="0"/>
+          <a:chExt cx="0" cy="0"/>
+        </a:xfrm>
+      </p:grpSpPr>
+      <p:sp>
+        <p:nvSpPr>
+          <p:cNvPr id="110" name="Google Shape;110;p17"/>
+          <p:cNvSpPr txBox="1">
+            <a:spLocks noGrp="1"/>
+          </p:cNvSpPr>
+          <p:nvPr>
+            <p:ph type="title"/>
+          </p:nvPr>
+        </p:nvSpPr>
+        <p:spPr>
+          <a:xfrm>
+            <a:off x="786150" y="410826"/>
+            <a:ext cx="7571700" cy="936900"/>
+          </a:xfrm>
+          <a:prstGeom prst="rect">
+            <a:avLst/>
+          </a:prstGeom>
+        </p:spPr>
+        <p:txBody>
+          <a:bodyPr spcFirstLastPara="1" wrap="square" lIns="91425" tIns="91425" rIns="91425" bIns="91425" anchor="b" anchorCtr="0">
+            <a:noAutofit/>
+          </a:bodyPr>
+          <a:lstStyle/>
+          <a:p>
+            <a:pPr marL="0" lvl="0" indent="0" algn="l" rtl="0">
+              <a:spcBef>
+                <a:spcPts val="0"/>
+              </a:spcBef>
+              <a:spcAft>
+                <a:spcPts val="0"/>
+              </a:spcAft>
+              <a:buNone/>
+            </a:pPr>
+            <a:r>
+              <a:rPr lang="en-US" dirty="0"/>
+              <a:t>Azure Container Instance</a:t>
+            </a:r>
+            <a:endParaRPr dirty="0"/>
+          </a:p>
+        </p:txBody>
+      </p:sp>
+      <p:sp>
+        <p:nvSpPr>
+          <p:cNvPr id="111" name="Google Shape;111;p17"/>
+          <p:cNvSpPr txBox="1">
+            <a:spLocks noGrp="1"/>
+          </p:cNvSpPr>
+          <p:nvPr>
+            <p:ph type="body" idx="1"/>
+          </p:nvPr>
+        </p:nvSpPr>
+        <p:spPr>
+          <a:xfrm>
+            <a:off x="786150" y="1682267"/>
+            <a:ext cx="7571700" cy="4764900"/>
+          </a:xfrm>
+          <a:prstGeom prst="rect">
+            <a:avLst/>
+          </a:prstGeom>
+        </p:spPr>
+        <p:txBody>
+          <a:bodyPr spcFirstLastPara="1" wrap="square" lIns="91425" tIns="91425" rIns="91425" bIns="91425" anchor="t" anchorCtr="0">
+            <a:noAutofit/>
+          </a:bodyPr>
+          <a:lstStyle/>
+          <a:p>
+            <a:pPr marL="38100" lvl="0" indent="0">
+              <a:buNone/>
+            </a:pPr>
+            <a:r>
+              <a:rPr lang="en-US" dirty="0"/>
+              <a:t>Create a resource group with the following command:</a:t>
+            </a:r>
+          </a:p>
+          <a:p>
+            <a:pPr marL="38100" lvl="0" indent="0">
+              <a:buNone/>
+            </a:pPr>
+            <a:r>
+              <a:rPr lang="en-US" dirty="0" err="1"/>
+              <a:t>az</a:t>
+            </a:r>
+            <a:r>
+              <a:rPr lang="en-US" dirty="0"/>
+              <a:t> group create --name </a:t>
+            </a:r>
+            <a:r>
+              <a:rPr lang="en-US" dirty="0" err="1"/>
+              <a:t>navGroup</a:t>
+            </a:r>
+            <a:r>
+              <a:rPr lang="en-US" dirty="0"/>
+              <a:t> --location </a:t>
+            </a:r>
+            <a:r>
+              <a:rPr lang="en-US" dirty="0" err="1"/>
+              <a:t>WestEurope</a:t>
+            </a:r>
+            <a:endParaRPr lang="en-US" dirty="0"/>
+          </a:p>
+        </p:txBody>
+      </p:sp>
+      <p:sp>
+        <p:nvSpPr>
+          <p:cNvPr id="112" name="Google Shape;112;p17"/>
+          <p:cNvSpPr txBox="1">
+            <a:spLocks noGrp="1"/>
+          </p:cNvSpPr>
+          <p:nvPr>
+            <p:ph type="sldNum" idx="12"/>
+          </p:nvPr>
+        </p:nvSpPr>
+        <p:spPr>
+          <a:xfrm>
+            <a:off x="8404384" y="6333134"/>
+            <a:ext cx="548700" cy="525000"/>
+          </a:xfrm>
+          <a:prstGeom prst="rect">
+            <a:avLst/>
+          </a:prstGeom>
+        </p:spPr>
+        <p:txBody>
+          <a:bodyPr spcFirstLastPara="1" wrap="square" lIns="91425" tIns="91425" rIns="91425" bIns="91425" anchor="t" anchorCtr="0">
+            <a:noAutofit/>
+          </a:bodyPr>
+          <a:lstStyle/>
+          <a:p>
+            <a:pPr marL="0" lvl="0" indent="0" algn="r" rtl="0">
+              <a:spcBef>
+                <a:spcPts val="0"/>
+              </a:spcBef>
+              <a:spcAft>
+                <a:spcPts val="0"/>
+              </a:spcAft>
+              <a:buNone/>
+            </a:pPr>
+            <a:fld id="{00000000-1234-1234-1234-123412341234}" type="slidenum">
+              <a:rPr lang="en"/>
+              <a:t>105</a:t>
+            </a:fld>
+            <a:endParaRPr/>
+          </a:p>
+        </p:txBody>
+      </p:sp>
+    </p:spTree>
+    <p:extLst>
+      <p:ext uri="{BB962C8B-B14F-4D97-AF65-F5344CB8AC3E}">
+        <p14:creationId xmlns:p14="http://schemas.microsoft.com/office/powerpoint/2010/main" val="2539784963"/>
+      </p:ext>
+    </p:extLst>
+  </p:cSld>
+  <p:clrMapOvr>
+    <a:masterClrMapping/>
+  </p:clrMapOvr>
+</p:sld>
+</file>
+
+<file path=ppt/slides/slide106.xml><?xml version="1.0" encoding="utf-8"?>
+<p:sld xmlns:a="http://schemas.openxmlformats.org/drawingml/2006/main" xmlns:r="http://schemas.openxmlformats.org/officeDocument/2006/relationships" xmlns:p="http://schemas.openxmlformats.org/presentationml/2006/main">
+  <p:cSld>
+    <p:spTree>
+      <p:nvGrpSpPr>
+        <p:cNvPr id="1" name="Shape 109"/>
+        <p:cNvGrpSpPr/>
+        <p:nvPr/>
+      </p:nvGrpSpPr>
+      <p:grpSpPr>
+        <a:xfrm>
+          <a:off x="0" y="0"/>
+          <a:ext cx="0" cy="0"/>
+          <a:chOff x="0" y="0"/>
+          <a:chExt cx="0" cy="0"/>
+        </a:xfrm>
+      </p:grpSpPr>
+      <p:sp>
+        <p:nvSpPr>
+          <p:cNvPr id="110" name="Google Shape;110;p17"/>
+          <p:cNvSpPr txBox="1">
+            <a:spLocks noGrp="1"/>
+          </p:cNvSpPr>
+          <p:nvPr>
+            <p:ph type="title"/>
+          </p:nvPr>
+        </p:nvSpPr>
+        <p:spPr>
+          <a:xfrm>
+            <a:off x="786150" y="410826"/>
+            <a:ext cx="7571700" cy="936900"/>
+          </a:xfrm>
+          <a:prstGeom prst="rect">
+            <a:avLst/>
+          </a:prstGeom>
+        </p:spPr>
+        <p:txBody>
+          <a:bodyPr spcFirstLastPara="1" wrap="square" lIns="91425" tIns="91425" rIns="91425" bIns="91425" anchor="b" anchorCtr="0">
+            <a:noAutofit/>
+          </a:bodyPr>
+          <a:lstStyle/>
+          <a:p>
+            <a:pPr marL="0" lvl="0" indent="0" algn="l" rtl="0">
+              <a:spcBef>
+                <a:spcPts val="0"/>
+              </a:spcBef>
+              <a:spcAft>
+                <a:spcPts val="0"/>
+              </a:spcAft>
+              <a:buNone/>
+            </a:pPr>
+            <a:r>
+              <a:rPr lang="en-US" dirty="0"/>
+              <a:t>Azure Container Instance</a:t>
+            </a:r>
+            <a:endParaRPr dirty="0"/>
+          </a:p>
+        </p:txBody>
+      </p:sp>
+      <p:sp>
+        <p:nvSpPr>
+          <p:cNvPr id="111" name="Google Shape;111;p17"/>
+          <p:cNvSpPr txBox="1">
+            <a:spLocks noGrp="1"/>
+          </p:cNvSpPr>
+          <p:nvPr>
+            <p:ph type="body" idx="1"/>
+          </p:nvPr>
+        </p:nvSpPr>
+        <p:spPr>
+          <a:xfrm>
+            <a:off x="786150" y="1682267"/>
+            <a:ext cx="7571700" cy="4764900"/>
+          </a:xfrm>
+          <a:prstGeom prst="rect">
+            <a:avLst/>
+          </a:prstGeom>
+        </p:spPr>
+        <p:txBody>
+          <a:bodyPr spcFirstLastPara="1" wrap="square" lIns="91425" tIns="91425" rIns="91425" bIns="91425" anchor="t" anchorCtr="0">
+            <a:noAutofit/>
+          </a:bodyPr>
+          <a:lstStyle/>
+          <a:p>
+            <a:pPr marL="38100" lvl="0" indent="0">
+              <a:buNone/>
+            </a:pPr>
+            <a:r>
+              <a:rPr lang="en-US" dirty="0"/>
+              <a:t>Create a container instance with the following command:</a:t>
+            </a:r>
+          </a:p>
+          <a:p>
+            <a:pPr marL="38100" lvl="0" indent="0">
+              <a:buNone/>
+            </a:pPr>
+            <a:r>
+              <a:rPr lang="en-US" sz="1600" dirty="0" err="1"/>
+              <a:t>az</a:t>
+            </a:r>
+            <a:r>
+              <a:rPr lang="en-US" sz="1600" dirty="0"/>
+              <a:t> container create --name </a:t>
+            </a:r>
+            <a:r>
+              <a:rPr lang="en-US" sz="1600" dirty="0" err="1"/>
+              <a:t>navcontainer</a:t>
+            </a:r>
+            <a:r>
+              <a:rPr lang="en-US" sz="1600" dirty="0"/>
+              <a:t> --image mcr.microsoft.com/</a:t>
+            </a:r>
+            <a:r>
+              <a:rPr lang="en-US" sz="1600" dirty="0" err="1"/>
+              <a:t>businesscentral</a:t>
+            </a:r>
+            <a:r>
+              <a:rPr lang="en-US" sz="1600" dirty="0"/>
+              <a:t>/</a:t>
+            </a:r>
+            <a:r>
+              <a:rPr lang="en-US" sz="1600" dirty="0" err="1"/>
+              <a:t>sandbox:dk</a:t>
+            </a:r>
+            <a:r>
+              <a:rPr lang="en-US" sz="1600" dirty="0"/>
+              <a:t> --registry-login-server mcr.microsoft.com --registry-password "P@ssw0rd" --resource-group </a:t>
+            </a:r>
+            <a:r>
+              <a:rPr lang="en-US" sz="1600" dirty="0" err="1"/>
+              <a:t>navgroup</a:t>
+            </a:r>
+            <a:r>
+              <a:rPr lang="en-US" sz="1600" dirty="0"/>
+              <a:t> --registry-username "</a:t>
+            </a:r>
+            <a:r>
+              <a:rPr lang="en-US" sz="1600" dirty="0" err="1"/>
+              <a:t>tmtd</a:t>
+            </a:r>
+            <a:r>
+              <a:rPr lang="en-US" sz="1600" dirty="0"/>
+              <a:t>" --</a:t>
+            </a:r>
+            <a:r>
+              <a:rPr lang="en-US" sz="1600" dirty="0" err="1"/>
+              <a:t>os</a:t>
+            </a:r>
+            <a:r>
+              <a:rPr lang="en-US" sz="1600" dirty="0"/>
+              <a:t>-type Windows --</a:t>
+            </a:r>
+            <a:r>
+              <a:rPr lang="en-US" sz="1600" dirty="0" err="1"/>
+              <a:t>cpu</a:t>
+            </a:r>
+            <a:r>
+              <a:rPr lang="en-US" sz="1600" dirty="0"/>
+              <a:t> 2 --memory 3 --environment-variables ACCEPT_EULA=Y --</a:t>
+            </a:r>
+            <a:r>
+              <a:rPr lang="en-US" sz="1600" dirty="0" err="1"/>
+              <a:t>ip</a:t>
+            </a:r>
+            <a:r>
+              <a:rPr lang="en-US" sz="1600" dirty="0"/>
+              <a:t>-address public --port 443</a:t>
+            </a:r>
+          </a:p>
+          <a:p>
+            <a:pPr marL="38100" lvl="0" indent="0">
+              <a:buNone/>
+            </a:pPr>
+            <a:endParaRPr lang="en-US" sz="1600" dirty="0"/>
+          </a:p>
+          <a:p>
+            <a:pPr marL="38100" lvl="0" indent="0">
+              <a:buNone/>
+            </a:pPr>
+            <a:r>
+              <a:rPr lang="en-US" sz="1600" dirty="0"/>
+              <a:t>You can of course replace the values with the image, container instance name, username, and password etc. you want.</a:t>
+            </a:r>
+          </a:p>
+          <a:p>
+            <a:pPr marL="38100" lvl="0" indent="0">
+              <a:buNone/>
+            </a:pPr>
+            <a:r>
+              <a:rPr lang="en-US" sz="1600" dirty="0"/>
+              <a:t>Note, however, that the username and password created here are not used to login to your Business Central instance.</a:t>
+            </a:r>
+          </a:p>
+        </p:txBody>
+      </p:sp>
+      <p:sp>
+        <p:nvSpPr>
+          <p:cNvPr id="112" name="Google Shape;112;p17"/>
+          <p:cNvSpPr txBox="1">
+            <a:spLocks noGrp="1"/>
+          </p:cNvSpPr>
+          <p:nvPr>
+            <p:ph type="sldNum" idx="12"/>
+          </p:nvPr>
+        </p:nvSpPr>
+        <p:spPr>
+          <a:xfrm>
+            <a:off x="8404384" y="6333134"/>
+            <a:ext cx="548700" cy="525000"/>
+          </a:xfrm>
+          <a:prstGeom prst="rect">
+            <a:avLst/>
+          </a:prstGeom>
+        </p:spPr>
+        <p:txBody>
+          <a:bodyPr spcFirstLastPara="1" wrap="square" lIns="91425" tIns="91425" rIns="91425" bIns="91425" anchor="t" anchorCtr="0">
+            <a:noAutofit/>
+          </a:bodyPr>
+          <a:lstStyle/>
+          <a:p>
+            <a:pPr marL="0" lvl="0" indent="0" algn="r" rtl="0">
+              <a:spcBef>
+                <a:spcPts val="0"/>
+              </a:spcBef>
+              <a:spcAft>
+                <a:spcPts val="0"/>
+              </a:spcAft>
+              <a:buNone/>
+            </a:pPr>
+            <a:fld id="{00000000-1234-1234-1234-123412341234}" type="slidenum">
+              <a:rPr lang="en"/>
+              <a:t>106</a:t>
+            </a:fld>
+            <a:endParaRPr/>
+          </a:p>
+        </p:txBody>
+      </p:sp>
+    </p:spTree>
+    <p:extLst>
+      <p:ext uri="{BB962C8B-B14F-4D97-AF65-F5344CB8AC3E}">
+        <p14:creationId xmlns:p14="http://schemas.microsoft.com/office/powerpoint/2010/main" val="3328855129"/>
+      </p:ext>
+    </p:extLst>
+  </p:cSld>
+  <p:clrMapOvr>
+    <a:masterClrMapping/>
+  </p:clrMapOvr>
+</p:sld>
+</file>
+
+<file path=ppt/slides/slide107.xml><?xml version="1.0" encoding="utf-8"?>
+<p:sld xmlns:a="http://schemas.openxmlformats.org/drawingml/2006/main" xmlns:r="http://schemas.openxmlformats.org/officeDocument/2006/relationships" xmlns:p="http://schemas.openxmlformats.org/presentationml/2006/main">
+  <p:cSld>
+    <p:spTree>
+      <p:nvGrpSpPr>
+        <p:cNvPr id="1" name="Shape 109"/>
+        <p:cNvGrpSpPr/>
+        <p:nvPr/>
+      </p:nvGrpSpPr>
+      <p:grpSpPr>
+        <a:xfrm>
+          <a:off x="0" y="0"/>
+          <a:ext cx="0" cy="0"/>
+          <a:chOff x="0" y="0"/>
+          <a:chExt cx="0" cy="0"/>
+        </a:xfrm>
+      </p:grpSpPr>
+      <p:sp>
+        <p:nvSpPr>
+          <p:cNvPr id="110" name="Google Shape;110;p17"/>
+          <p:cNvSpPr txBox="1">
+            <a:spLocks noGrp="1"/>
+          </p:cNvSpPr>
+          <p:nvPr>
+            <p:ph type="title"/>
+          </p:nvPr>
+        </p:nvSpPr>
+        <p:spPr>
+          <a:xfrm>
+            <a:off x="786150" y="410826"/>
+            <a:ext cx="7571700" cy="936900"/>
+          </a:xfrm>
+          <a:prstGeom prst="rect">
+            <a:avLst/>
+          </a:prstGeom>
+        </p:spPr>
+        <p:txBody>
+          <a:bodyPr spcFirstLastPara="1" wrap="square" lIns="91425" tIns="91425" rIns="91425" bIns="91425" anchor="b" anchorCtr="0">
+            <a:noAutofit/>
+          </a:bodyPr>
+          <a:lstStyle/>
+          <a:p>
+            <a:pPr marL="0" lvl="0" indent="0" algn="l" rtl="0">
+              <a:spcBef>
+                <a:spcPts val="0"/>
+              </a:spcBef>
+              <a:spcAft>
+                <a:spcPts val="0"/>
+              </a:spcAft>
+              <a:buNone/>
+            </a:pPr>
+            <a:r>
+              <a:rPr lang="en-US" dirty="0"/>
+              <a:t>Azure Container Instance</a:t>
+            </a:r>
+            <a:endParaRPr dirty="0"/>
+          </a:p>
+        </p:txBody>
+      </p:sp>
+      <p:sp>
+        <p:nvSpPr>
+          <p:cNvPr id="111" name="Google Shape;111;p17"/>
+          <p:cNvSpPr txBox="1">
+            <a:spLocks noGrp="1"/>
+          </p:cNvSpPr>
+          <p:nvPr>
+            <p:ph type="body" idx="1"/>
+          </p:nvPr>
+        </p:nvSpPr>
+        <p:spPr>
+          <a:xfrm>
+            <a:off x="786150" y="1682267"/>
+            <a:ext cx="7571700" cy="4764900"/>
+          </a:xfrm>
+          <a:prstGeom prst="rect">
+            <a:avLst/>
+          </a:prstGeom>
+        </p:spPr>
+        <p:txBody>
+          <a:bodyPr spcFirstLastPara="1" wrap="square" lIns="91425" tIns="91425" rIns="91425" bIns="91425" anchor="t" anchorCtr="0">
+            <a:noAutofit/>
+          </a:bodyPr>
+          <a:lstStyle/>
+          <a:p>
+            <a:pPr marL="38100" lvl="0" indent="0">
+              <a:buNone/>
+            </a:pPr>
+            <a:r>
+              <a:rPr lang="en-US" dirty="0"/>
+              <a:t>In your Cloud Shell, you will get an IP address in the log. Go to this website:</a:t>
+            </a:r>
+            <a:endParaRPr lang="en-US" sz="1600" dirty="0"/>
+          </a:p>
+          <a:p>
+            <a:pPr marL="38100" lvl="0" indent="0" algn="ctr">
+              <a:buNone/>
+            </a:pPr>
+            <a:r>
+              <a:rPr lang="en-US" dirty="0"/>
+              <a:t>https://&lt;IP address&gt;/NAV</a:t>
+            </a:r>
+          </a:p>
+          <a:p>
+            <a:pPr marL="38100" lvl="0" indent="0">
+              <a:buNone/>
+            </a:pPr>
+            <a:endParaRPr lang="en-US" dirty="0"/>
+          </a:p>
+          <a:p>
+            <a:pPr marL="38100" lvl="0" indent="0">
+              <a:buNone/>
+            </a:pPr>
+            <a:r>
+              <a:rPr lang="en-US" dirty="0"/>
+              <a:t>This will take you to the login prompt for Business Central.</a:t>
+            </a:r>
+          </a:p>
+        </p:txBody>
+      </p:sp>
+      <p:sp>
+        <p:nvSpPr>
+          <p:cNvPr id="112" name="Google Shape;112;p17"/>
+          <p:cNvSpPr txBox="1">
+            <a:spLocks noGrp="1"/>
+          </p:cNvSpPr>
+          <p:nvPr>
+            <p:ph type="sldNum" idx="12"/>
+          </p:nvPr>
+        </p:nvSpPr>
+        <p:spPr>
+          <a:xfrm>
+            <a:off x="8404384" y="6333134"/>
+            <a:ext cx="548700" cy="525000"/>
+          </a:xfrm>
+          <a:prstGeom prst="rect">
+            <a:avLst/>
+          </a:prstGeom>
+        </p:spPr>
+        <p:txBody>
+          <a:bodyPr spcFirstLastPara="1" wrap="square" lIns="91425" tIns="91425" rIns="91425" bIns="91425" anchor="t" anchorCtr="0">
+            <a:noAutofit/>
+          </a:bodyPr>
+          <a:lstStyle/>
+          <a:p>
+            <a:pPr marL="0" lvl="0" indent="0" algn="r" rtl="0">
+              <a:spcBef>
+                <a:spcPts val="0"/>
+              </a:spcBef>
+              <a:spcAft>
+                <a:spcPts val="0"/>
+              </a:spcAft>
+              <a:buNone/>
+            </a:pPr>
+            <a:fld id="{00000000-1234-1234-1234-123412341234}" type="slidenum">
+              <a:rPr lang="en"/>
+              <a:t>107</a:t>
+            </a:fld>
+            <a:endParaRPr/>
+          </a:p>
+        </p:txBody>
+      </p:sp>
+    </p:spTree>
+    <p:extLst>
+      <p:ext uri="{BB962C8B-B14F-4D97-AF65-F5344CB8AC3E}">
+        <p14:creationId xmlns:p14="http://schemas.microsoft.com/office/powerpoint/2010/main" val="2159881838"/>
+      </p:ext>
+    </p:extLst>
+  </p:cSld>
+  <p:clrMapOvr>
+    <a:masterClrMapping/>
+  </p:clrMapOvr>
+</p:sld>
+</file>
+
+<file path=ppt/slides/slide108.xml><?xml version="1.0" encoding="utf-8"?>
+<p:sld xmlns:a="http://schemas.openxmlformats.org/drawingml/2006/main" xmlns:r="http://schemas.openxmlformats.org/officeDocument/2006/relationships" xmlns:p="http://schemas.openxmlformats.org/presentationml/2006/main">
+  <p:cSld>
+    <p:spTree>
+      <p:nvGrpSpPr>
+        <p:cNvPr id="1" name="Shape 109"/>
+        <p:cNvGrpSpPr/>
+        <p:nvPr/>
+      </p:nvGrpSpPr>
+      <p:grpSpPr>
+        <a:xfrm>
+          <a:off x="0" y="0"/>
+          <a:ext cx="0" cy="0"/>
+          <a:chOff x="0" y="0"/>
+          <a:chExt cx="0" cy="0"/>
+        </a:xfrm>
+      </p:grpSpPr>
+      <p:sp>
+        <p:nvSpPr>
+          <p:cNvPr id="110" name="Google Shape;110;p17"/>
+          <p:cNvSpPr txBox="1">
+            <a:spLocks noGrp="1"/>
+          </p:cNvSpPr>
+          <p:nvPr>
+            <p:ph type="title"/>
+          </p:nvPr>
+        </p:nvSpPr>
+        <p:spPr>
+          <a:xfrm>
+            <a:off x="786150" y="410826"/>
+            <a:ext cx="7571700" cy="936900"/>
+          </a:xfrm>
+          <a:prstGeom prst="rect">
+            <a:avLst/>
+          </a:prstGeom>
+        </p:spPr>
+        <p:txBody>
+          <a:bodyPr spcFirstLastPara="1" wrap="square" lIns="91425" tIns="91425" rIns="91425" bIns="91425" anchor="b" anchorCtr="0">
+            <a:noAutofit/>
+          </a:bodyPr>
+          <a:lstStyle/>
+          <a:p>
+            <a:pPr marL="0" lvl="0" indent="0" algn="l" rtl="0">
+              <a:spcBef>
+                <a:spcPts val="0"/>
+              </a:spcBef>
+              <a:spcAft>
+                <a:spcPts val="0"/>
+              </a:spcAft>
+              <a:buNone/>
+            </a:pPr>
+            <a:r>
+              <a:rPr lang="en-US" dirty="0"/>
+              <a:t>Azure Container Instance</a:t>
+            </a:r>
+            <a:endParaRPr dirty="0"/>
+          </a:p>
+        </p:txBody>
+      </p:sp>
+      <p:sp>
+        <p:nvSpPr>
+          <p:cNvPr id="111" name="Google Shape;111;p17"/>
+          <p:cNvSpPr txBox="1">
+            <a:spLocks noGrp="1"/>
+          </p:cNvSpPr>
+          <p:nvPr>
+            <p:ph type="body" idx="1"/>
+          </p:nvPr>
+        </p:nvSpPr>
+        <p:spPr>
+          <a:xfrm>
+            <a:off x="786150" y="1682267"/>
+            <a:ext cx="7571700" cy="4764900"/>
+          </a:xfrm>
+          <a:prstGeom prst="rect">
+            <a:avLst/>
+          </a:prstGeom>
+        </p:spPr>
+        <p:txBody>
+          <a:bodyPr spcFirstLastPara="1" wrap="square" lIns="91425" tIns="91425" rIns="91425" bIns="91425" anchor="t" anchorCtr="0">
+            <a:noAutofit/>
+          </a:bodyPr>
+          <a:lstStyle/>
+          <a:p>
+            <a:pPr marL="38100" lvl="0" indent="0">
+              <a:buNone/>
+            </a:pPr>
+            <a:r>
+              <a:rPr lang="en-US" dirty="0"/>
+              <a:t>Go back to the Cloud Shell.</a:t>
+            </a:r>
+          </a:p>
+          <a:p>
+            <a:pPr marL="38100" lvl="0" indent="0">
+              <a:buNone/>
+            </a:pPr>
+            <a:endParaRPr lang="en-US" dirty="0"/>
+          </a:p>
+          <a:p>
+            <a:pPr marL="38100" lvl="0" indent="0">
+              <a:buNone/>
+            </a:pPr>
+            <a:r>
+              <a:rPr lang="en-US" dirty="0"/>
+              <a:t>Find your username and password with the following command:</a:t>
+            </a:r>
+          </a:p>
+          <a:p>
+            <a:pPr marL="38100" lvl="0" indent="0">
+              <a:buNone/>
+            </a:pPr>
+            <a:endParaRPr lang="en-US" dirty="0"/>
+          </a:p>
+          <a:p>
+            <a:pPr marL="38100" lvl="0" indent="0" algn="ctr">
+              <a:buNone/>
+            </a:pPr>
+            <a:r>
+              <a:rPr lang="en-US" sz="2000" dirty="0" err="1"/>
+              <a:t>az</a:t>
+            </a:r>
+            <a:r>
+              <a:rPr lang="en-US" sz="2000" dirty="0"/>
+              <a:t> container logs --resource-group </a:t>
+            </a:r>
+            <a:r>
+              <a:rPr lang="en-US" sz="2000" dirty="0" err="1"/>
+              <a:t>navgroup</a:t>
+            </a:r>
+            <a:r>
+              <a:rPr lang="en-US" sz="2000" dirty="0"/>
+              <a:t> --name </a:t>
+            </a:r>
+            <a:r>
+              <a:rPr lang="en-US" sz="2000" dirty="0" err="1"/>
+              <a:t>navcontainer</a:t>
+            </a:r>
+            <a:endParaRPr lang="en-US" sz="2000" dirty="0"/>
+          </a:p>
+        </p:txBody>
+      </p:sp>
+      <p:sp>
+        <p:nvSpPr>
+          <p:cNvPr id="112" name="Google Shape;112;p17"/>
+          <p:cNvSpPr txBox="1">
+            <a:spLocks noGrp="1"/>
+          </p:cNvSpPr>
+          <p:nvPr>
+            <p:ph type="sldNum" idx="12"/>
+          </p:nvPr>
+        </p:nvSpPr>
+        <p:spPr>
+          <a:xfrm>
+            <a:off x="8404384" y="6333134"/>
+            <a:ext cx="548700" cy="525000"/>
+          </a:xfrm>
+          <a:prstGeom prst="rect">
+            <a:avLst/>
+          </a:prstGeom>
+        </p:spPr>
+        <p:txBody>
+          <a:bodyPr spcFirstLastPara="1" wrap="square" lIns="91425" tIns="91425" rIns="91425" bIns="91425" anchor="t" anchorCtr="0">
+            <a:noAutofit/>
+          </a:bodyPr>
+          <a:lstStyle/>
+          <a:p>
+            <a:pPr marL="0" lvl="0" indent="0" algn="r" rtl="0">
+              <a:spcBef>
+                <a:spcPts val="0"/>
+              </a:spcBef>
+              <a:spcAft>
+                <a:spcPts val="0"/>
+              </a:spcAft>
+              <a:buNone/>
+            </a:pPr>
+            <a:fld id="{00000000-1234-1234-1234-123412341234}" type="slidenum">
+              <a:rPr lang="en"/>
+              <a:t>108</a:t>
+            </a:fld>
+            <a:endParaRPr/>
+          </a:p>
+        </p:txBody>
+      </p:sp>
+    </p:spTree>
+    <p:extLst>
+      <p:ext uri="{BB962C8B-B14F-4D97-AF65-F5344CB8AC3E}">
+        <p14:creationId xmlns:p14="http://schemas.microsoft.com/office/powerpoint/2010/main" val="3471650720"/>
+      </p:ext>
+    </p:extLst>
+  </p:cSld>
+  <p:clrMapOvr>
+    <a:masterClrMapping/>
+  </p:clrMapOvr>
+</p:sld>
+</file>
+
+<file path=ppt/slides/slide109.xml><?xml version="1.0" encoding="utf-8"?>
+<p:sld xmlns:a="http://schemas.openxmlformats.org/drawingml/2006/main" xmlns:r="http://schemas.openxmlformats.org/officeDocument/2006/relationships" xmlns:p="http://schemas.openxmlformats.org/presentationml/2006/main">
+  <p:cSld>
+    <p:spTree>
+      <p:nvGrpSpPr>
         <p:cNvPr id="1" name="Shape 374"/>
         <p:cNvGrpSpPr/>
         <p:nvPr/>
@@ -18447,339 +19956,13 @@
             </a:pPr>
             <a:fld id="{00000000-1234-1234-1234-123412341234}" type="slidenum">
               <a:rPr lang="en"/>
-              <a:t>104</a:t>
+              <a:t>109</a:t>
             </a:fld>
             <a:endParaRPr/>
           </a:p>
         </p:txBody>
       </p:sp>
     </p:spTree>
-  </p:cSld>
-  <p:clrMapOvr>
-    <a:masterClrMapping/>
-  </p:clrMapOvr>
-</p:sld>
-</file>
-
-<file path=ppt/slides/slide105.xml><?xml version="1.0" encoding="utf-8"?>
-<p:sld xmlns:a="http://schemas.openxmlformats.org/drawingml/2006/main" xmlns:r="http://schemas.openxmlformats.org/officeDocument/2006/relationships" xmlns:p="http://schemas.openxmlformats.org/presentationml/2006/main">
-  <p:cSld>
-    <p:spTree>
-      <p:nvGrpSpPr>
-        <p:cNvPr id="1" name="Shape 148"/>
-        <p:cNvGrpSpPr/>
-        <p:nvPr/>
-      </p:nvGrpSpPr>
-      <p:grpSpPr>
-        <a:xfrm>
-          <a:off x="0" y="0"/>
-          <a:ext cx="0" cy="0"/>
-          <a:chOff x="0" y="0"/>
-          <a:chExt cx="0" cy="0"/>
-        </a:xfrm>
-      </p:grpSpPr>
-      <p:sp>
-        <p:nvSpPr>
-          <p:cNvPr id="150" name="Google Shape;150;p21"/>
-          <p:cNvSpPr txBox="1">
-            <a:spLocks noGrp="1"/>
-          </p:cNvSpPr>
-          <p:nvPr>
-            <p:ph type="title"/>
-          </p:nvPr>
-        </p:nvSpPr>
-        <p:spPr>
-          <a:prstGeom prst="rect">
-            <a:avLst/>
-          </a:prstGeom>
-        </p:spPr>
-        <p:txBody>
-          <a:bodyPr spcFirstLastPara="1" wrap="square" lIns="91425" tIns="91425" rIns="91425" bIns="91425" anchor="b" anchorCtr="0">
-            <a:noAutofit/>
-          </a:bodyPr>
-          <a:lstStyle/>
-          <a:p>
-            <a:pPr marL="0" lvl="0" indent="0" algn="l" rtl="0">
-              <a:spcBef>
-                <a:spcPts val="0"/>
-              </a:spcBef>
-              <a:spcAft>
-                <a:spcPts val="0"/>
-              </a:spcAft>
-              <a:buNone/>
-            </a:pPr>
-            <a:r>
-              <a:rPr lang="en-US" dirty="0"/>
-              <a:t>Resources</a:t>
-            </a:r>
-            <a:endParaRPr dirty="0"/>
-          </a:p>
-        </p:txBody>
-      </p:sp>
-      <p:sp>
-        <p:nvSpPr>
-          <p:cNvPr id="151" name="Google Shape;151;p21"/>
-          <p:cNvSpPr txBox="1">
-            <a:spLocks noGrp="1"/>
-          </p:cNvSpPr>
-          <p:nvPr>
-            <p:ph type="body" idx="1"/>
-          </p:nvPr>
-        </p:nvSpPr>
-        <p:spPr>
-          <a:prstGeom prst="rect">
-            <a:avLst/>
-          </a:prstGeom>
-        </p:spPr>
-        <p:txBody>
-          <a:bodyPr spcFirstLastPara="1" wrap="square" lIns="91425" tIns="91425" rIns="91425" bIns="91425" anchor="t" anchorCtr="0">
-            <a:noAutofit/>
-          </a:bodyPr>
-          <a:lstStyle/>
-          <a:p>
-            <a:pPr marL="0" lvl="0" indent="0" algn="l" rtl="0">
-              <a:spcBef>
-                <a:spcPts val="600"/>
-              </a:spcBef>
-              <a:spcAft>
-                <a:spcPts val="0"/>
-              </a:spcAft>
-              <a:buNone/>
-            </a:pPr>
-            <a:r>
-              <a:rPr lang="en-US" sz="1200" dirty="0">
-                <a:hlinkClick r:id="rId3" action="ppaction://hlinkfile"/>
-              </a:rPr>
-              <a:t>Business Central Sandbox Image</a:t>
-            </a:r>
-            <a:endParaRPr lang="en-US" sz="1200" dirty="0"/>
-          </a:p>
-          <a:p>
-            <a:pPr marL="0" lvl="0" indent="0">
-              <a:buNone/>
-            </a:pPr>
-            <a:r>
-              <a:rPr lang="en-US" sz="1200" dirty="0">
-                <a:hlinkClick r:id="rId4" action="ppaction://hlinkfile"/>
-              </a:rPr>
-              <a:t>Business Central On Premise Image</a:t>
-            </a:r>
-            <a:endParaRPr lang="en-US" sz="1200" dirty="0"/>
-          </a:p>
-          <a:p>
-            <a:pPr marL="0" indent="0">
-              <a:buNone/>
-            </a:pPr>
-            <a:r>
-              <a:rPr lang="en-US" sz="1200" dirty="0">
-                <a:hlinkClick r:id="rId5"/>
-              </a:rPr>
-              <a:t>Docker Documentation</a:t>
-            </a:r>
-            <a:endParaRPr lang="en-US" sz="1200" dirty="0"/>
-          </a:p>
-          <a:p>
-            <a:pPr marL="0" indent="0">
-              <a:buNone/>
-            </a:pPr>
-            <a:r>
-              <a:rPr lang="en-US" sz="1200" dirty="0">
-                <a:hlinkClick r:id="rId6"/>
-              </a:rPr>
-              <a:t>Docker Hub Organization for </a:t>
-            </a:r>
-            <a:r>
-              <a:rPr lang="en-US" sz="1200">
-                <a:hlinkClick r:id="rId6"/>
-              </a:rPr>
-              <a:t>Netcompany ERP</a:t>
-            </a:r>
-            <a:endParaRPr lang="en-US" sz="1200" dirty="0"/>
-          </a:p>
-          <a:p>
-            <a:pPr marL="0" lvl="0" indent="0">
-              <a:buNone/>
-            </a:pPr>
-            <a:r>
-              <a:rPr lang="da-DK" sz="1200" dirty="0">
-                <a:hlinkClick r:id="rId7"/>
-              </a:rPr>
-              <a:t>GitHub for NAV/BC Images</a:t>
-            </a:r>
-            <a:endParaRPr lang="da-DK" sz="1200" dirty="0"/>
-          </a:p>
-          <a:p>
-            <a:pPr marL="0" lvl="0" indent="0">
-              <a:buNone/>
-            </a:pPr>
-            <a:r>
-              <a:rPr lang="da-DK" sz="1200" dirty="0">
-                <a:hlinkClick r:id="rId8"/>
-              </a:rPr>
-              <a:t>GitHub for </a:t>
-            </a:r>
-            <a:r>
-              <a:rPr lang="da-DK" sz="1200" dirty="0" err="1">
-                <a:hlinkClick r:id="rId8"/>
-              </a:rPr>
-              <a:t>NavContainerHelper</a:t>
-            </a:r>
-            <a:endParaRPr lang="da-DK" sz="1200" dirty="0"/>
-          </a:p>
-          <a:p>
-            <a:pPr marL="0" lvl="0" indent="0" algn="l" rtl="0">
-              <a:spcBef>
-                <a:spcPts val="600"/>
-              </a:spcBef>
-              <a:spcAft>
-                <a:spcPts val="0"/>
-              </a:spcAft>
-              <a:buNone/>
-            </a:pPr>
-            <a:r>
-              <a:rPr lang="en-US" sz="1200" dirty="0">
-                <a:hlinkClick r:id="rId9"/>
-              </a:rPr>
-              <a:t>Hyper-V vs. Process Isolation</a:t>
-            </a:r>
-            <a:endParaRPr lang="en-US" sz="1200" dirty="0"/>
-          </a:p>
-          <a:p>
-            <a:pPr marL="0" lvl="0" indent="0" algn="l" rtl="0">
-              <a:spcBef>
-                <a:spcPts val="600"/>
-              </a:spcBef>
-              <a:spcAft>
-                <a:spcPts val="0"/>
-              </a:spcAft>
-              <a:buNone/>
-            </a:pPr>
-            <a:r>
-              <a:rPr lang="en-US" sz="1200" dirty="0">
-                <a:hlinkClick r:id="rId10"/>
-              </a:rPr>
-              <a:t>Introduction to Business Central on Docker</a:t>
-            </a:r>
-            <a:endParaRPr lang="en-US" sz="1200" dirty="0"/>
-          </a:p>
-          <a:p>
-            <a:pPr marL="0" indent="0">
-              <a:buNone/>
-            </a:pPr>
-            <a:r>
-              <a:rPr lang="en-US" sz="1200" dirty="0">
-                <a:hlinkClick r:id="rId11"/>
-              </a:rPr>
-              <a:t>Introduction Video to Business Central on Docker</a:t>
-            </a:r>
-            <a:endParaRPr lang="en-US" sz="1200" dirty="0"/>
-          </a:p>
-          <a:p>
-            <a:pPr marL="0" lvl="0" indent="0">
-              <a:buNone/>
-            </a:pPr>
-            <a:r>
-              <a:rPr lang="en-US" sz="1200" dirty="0">
-                <a:hlinkClick r:id="rId12"/>
-              </a:rPr>
-              <a:t>List of Available BC Sandbox Versions</a:t>
-            </a:r>
-            <a:endParaRPr lang="en-US" sz="1200" dirty="0"/>
-          </a:p>
-          <a:p>
-            <a:pPr marL="0" lvl="0" indent="0">
-              <a:buNone/>
-            </a:pPr>
-            <a:r>
-              <a:rPr lang="en-US" sz="1200" dirty="0">
-                <a:hlinkClick r:id="rId13"/>
-              </a:rPr>
-              <a:t>List of Available BC On-Premises Versions</a:t>
-            </a:r>
-            <a:endParaRPr lang="en-US" sz="1200" dirty="0"/>
-          </a:p>
-          <a:p>
-            <a:pPr marL="0" indent="0">
-              <a:buNone/>
-            </a:pPr>
-            <a:r>
-              <a:rPr lang="en-US" sz="1200" dirty="0">
-                <a:hlinkClick r:id="rId14"/>
-              </a:rPr>
-              <a:t>Microsoft Learn – Learning Path for Azure Container Instances</a:t>
-            </a:r>
-            <a:endParaRPr lang="en-US" sz="1200" dirty="0"/>
-          </a:p>
-          <a:p>
-            <a:pPr marL="0" lvl="0" indent="0" algn="l" rtl="0">
-              <a:spcBef>
-                <a:spcPts val="600"/>
-              </a:spcBef>
-              <a:spcAft>
-                <a:spcPts val="0"/>
-              </a:spcAft>
-              <a:buNone/>
-            </a:pPr>
-            <a:r>
-              <a:rPr lang="en-US" sz="1200" dirty="0">
-                <a:hlinkClick r:id="rId15"/>
-              </a:rPr>
-              <a:t>Updates on </a:t>
-            </a:r>
-            <a:r>
-              <a:rPr lang="en-US" sz="1200" dirty="0" err="1">
-                <a:hlinkClick r:id="rId15"/>
-              </a:rPr>
-              <a:t>NavContainerHelper</a:t>
-            </a:r>
-            <a:endParaRPr lang="en-US" sz="1200" dirty="0"/>
-          </a:p>
-        </p:txBody>
-      </p:sp>
-      <p:sp>
-        <p:nvSpPr>
-          <p:cNvPr id="156" name="Google Shape;156;p21"/>
-          <p:cNvSpPr txBox="1">
-            <a:spLocks noGrp="1"/>
-          </p:cNvSpPr>
-          <p:nvPr>
-            <p:ph type="sldNum" idx="12"/>
-          </p:nvPr>
-        </p:nvSpPr>
-        <p:spPr>
-          <a:prstGeom prst="rect">
-            <a:avLst/>
-          </a:prstGeom>
-        </p:spPr>
-        <p:txBody>
-          <a:bodyPr spcFirstLastPara="1" wrap="square" lIns="91425" tIns="91425" rIns="91425" bIns="91425" anchor="t" anchorCtr="0">
-            <a:noAutofit/>
-          </a:bodyPr>
-          <a:lstStyle/>
-          <a:p>
-            <a:pPr marL="0" lvl="0" indent="0" algn="r" rtl="0">
-              <a:spcBef>
-                <a:spcPts val="0"/>
-              </a:spcBef>
-              <a:spcAft>
-                <a:spcPts val="0"/>
-              </a:spcAft>
-              <a:buNone/>
-            </a:pPr>
-            <a:fld id="{00000000-1234-1234-1234-123412341234}" type="slidenum">
-              <a:rPr lang="en"/>
-              <a:t>105</a:t>
-            </a:fld>
-            <a:endParaRPr/>
-          </a:p>
-        </p:txBody>
-      </p:sp>
-    </p:spTree>
-    <p:extLst>
-      <p:ext uri="{BB962C8B-B14F-4D97-AF65-F5344CB8AC3E}">
-        <p14:creationId xmlns:p14="http://schemas.microsoft.com/office/powerpoint/2010/main" val="4124776094"/>
-      </p:ext>
-    </p:extLst>
   </p:cSld>
   <p:clrMapOvr>
     <a:masterClrMapping/>
@@ -18959,6 +20142,473 @@
     <p:extLst>
       <p:ext uri="{BB962C8B-B14F-4D97-AF65-F5344CB8AC3E}">
         <p14:creationId xmlns:p14="http://schemas.microsoft.com/office/powerpoint/2010/main" val="203994847"/>
+      </p:ext>
+    </p:extLst>
+  </p:cSld>
+  <p:clrMapOvr>
+    <a:masterClrMapping/>
+  </p:clrMapOvr>
+  <p:timing>
+    <p:tnLst>
+      <p:par>
+        <p:cTn id="1" dur="indefinite" restart="never" nodeType="tmRoot">
+          <p:childTnLst>
+            <p:seq concurrent="1" nextAc="seek">
+              <p:cTn id="2" dur="indefinite" nodeType="mainSeq">
+                <p:childTnLst>
+                  <p:par>
+                    <p:cTn id="3" fill="hold">
+                      <p:stCondLst>
+                        <p:cond delay="indefinite"/>
+                      </p:stCondLst>
+                      <p:childTnLst>
+                        <p:par>
+                          <p:cTn id="4" fill="hold">
+                            <p:stCondLst>
+                              <p:cond delay="0"/>
+                            </p:stCondLst>
+                            <p:childTnLst>
+                              <p:par>
+                                <p:cTn id="5" presetID="1" presetClass="entr" presetSubtype="0" fill="hold" nodeType="clickEffect">
+                                  <p:stCondLst>
+                                    <p:cond delay="0"/>
+                                  </p:stCondLst>
+                                  <p:childTnLst>
+                                    <p:set>
+                                      <p:cBhvr>
+                                        <p:cTn id="6" dur="1" fill="hold">
+                                          <p:stCondLst>
+                                            <p:cond delay="0"/>
+                                          </p:stCondLst>
+                                        </p:cTn>
+                                        <p:tgtEl>
+                                          <p:spTgt spid="111">
+                                            <p:txEl>
+                                              <p:pRg st="0" end="0"/>
+                                            </p:txEl>
+                                          </p:spTgt>
+                                        </p:tgtEl>
+                                        <p:attrNameLst>
+                                          <p:attrName>style.visibility</p:attrName>
+                                        </p:attrNameLst>
+                                      </p:cBhvr>
+                                      <p:to>
+                                        <p:strVal val="visible"/>
+                                      </p:to>
+                                    </p:set>
+                                  </p:childTnLst>
+                                </p:cTn>
+                              </p:par>
+                              <p:par>
+                                <p:cTn id="7" presetID="1" presetClass="entr" presetSubtype="0" fill="hold" nodeType="withEffect">
+                                  <p:stCondLst>
+                                    <p:cond delay="0"/>
+                                  </p:stCondLst>
+                                  <p:childTnLst>
+                                    <p:set>
+                                      <p:cBhvr>
+                                        <p:cTn id="8" dur="1" fill="hold">
+                                          <p:stCondLst>
+                                            <p:cond delay="0"/>
+                                          </p:stCondLst>
+                                        </p:cTn>
+                                        <p:tgtEl>
+                                          <p:spTgt spid="111">
+                                            <p:txEl>
+                                              <p:pRg st="2" end="2"/>
+                                            </p:txEl>
+                                          </p:spTgt>
+                                        </p:tgtEl>
+                                        <p:attrNameLst>
+                                          <p:attrName>style.visibility</p:attrName>
+                                        </p:attrNameLst>
+                                      </p:cBhvr>
+                                      <p:to>
+                                        <p:strVal val="visible"/>
+                                      </p:to>
+                                    </p:set>
+                                  </p:childTnLst>
+                                </p:cTn>
+                              </p:par>
+                              <p:par>
+                                <p:cTn id="9" presetID="1" presetClass="entr" presetSubtype="0" fill="hold" nodeType="withEffect">
+                                  <p:stCondLst>
+                                    <p:cond delay="0"/>
+                                  </p:stCondLst>
+                                  <p:childTnLst>
+                                    <p:set>
+                                      <p:cBhvr>
+                                        <p:cTn id="10" dur="1" fill="hold">
+                                          <p:stCondLst>
+                                            <p:cond delay="0"/>
+                                          </p:stCondLst>
+                                        </p:cTn>
+                                        <p:tgtEl>
+                                          <p:spTgt spid="111">
+                                            <p:txEl>
+                                              <p:pRg st="3" end="3"/>
+                                            </p:txEl>
+                                          </p:spTgt>
+                                        </p:tgtEl>
+                                        <p:attrNameLst>
+                                          <p:attrName>style.visibility</p:attrName>
+                                        </p:attrNameLst>
+                                      </p:cBhvr>
+                                      <p:to>
+                                        <p:strVal val="visible"/>
+                                      </p:to>
+                                    </p:set>
+                                  </p:childTnLst>
+                                </p:cTn>
+                              </p:par>
+                            </p:childTnLst>
+                          </p:cTn>
+                        </p:par>
+                      </p:childTnLst>
+                    </p:cTn>
+                  </p:par>
+                </p:childTnLst>
+              </p:cTn>
+              <p:prevCondLst>
+                <p:cond evt="onPrev" delay="0">
+                  <p:tgtEl>
+                    <p:sldTgt/>
+                  </p:tgtEl>
+                </p:cond>
+              </p:prevCondLst>
+              <p:nextCondLst>
+                <p:cond evt="onNext" delay="0">
+                  <p:tgtEl>
+                    <p:sldTgt/>
+                  </p:tgtEl>
+                </p:cond>
+              </p:nextCondLst>
+            </p:seq>
+          </p:childTnLst>
+        </p:cTn>
+      </p:par>
+    </p:tnLst>
+  </p:timing>
+</p:sld>
+</file>
+
+<file path=ppt/slides/slide110.xml><?xml version="1.0" encoding="utf-8"?>
+<p:sld xmlns:a="http://schemas.openxmlformats.org/drawingml/2006/main" xmlns:r="http://schemas.openxmlformats.org/officeDocument/2006/relationships" xmlns:p="http://schemas.openxmlformats.org/presentationml/2006/main">
+  <p:cSld>
+    <p:spTree>
+      <p:nvGrpSpPr>
+        <p:cNvPr id="1" name="Shape 148"/>
+        <p:cNvGrpSpPr/>
+        <p:nvPr/>
+      </p:nvGrpSpPr>
+      <p:grpSpPr>
+        <a:xfrm>
+          <a:off x="0" y="0"/>
+          <a:ext cx="0" cy="0"/>
+          <a:chOff x="0" y="0"/>
+          <a:chExt cx="0" cy="0"/>
+        </a:xfrm>
+      </p:grpSpPr>
+      <p:sp>
+        <p:nvSpPr>
+          <p:cNvPr id="150" name="Google Shape;150;p21"/>
+          <p:cNvSpPr txBox="1">
+            <a:spLocks noGrp="1"/>
+          </p:cNvSpPr>
+          <p:nvPr>
+            <p:ph type="title"/>
+          </p:nvPr>
+        </p:nvSpPr>
+        <p:spPr>
+          <a:prstGeom prst="rect">
+            <a:avLst/>
+          </a:prstGeom>
+        </p:spPr>
+        <p:txBody>
+          <a:bodyPr spcFirstLastPara="1" wrap="square" lIns="91425" tIns="91425" rIns="91425" bIns="91425" anchor="b" anchorCtr="0">
+            <a:noAutofit/>
+          </a:bodyPr>
+          <a:lstStyle/>
+          <a:p>
+            <a:pPr marL="0" lvl="0" indent="0" algn="l" rtl="0">
+              <a:spcBef>
+                <a:spcPts val="0"/>
+              </a:spcBef>
+              <a:spcAft>
+                <a:spcPts val="0"/>
+              </a:spcAft>
+              <a:buNone/>
+            </a:pPr>
+            <a:r>
+              <a:rPr lang="en-US" dirty="0"/>
+              <a:t>Resources</a:t>
+            </a:r>
+            <a:endParaRPr dirty="0"/>
+          </a:p>
+        </p:txBody>
+      </p:sp>
+      <p:sp>
+        <p:nvSpPr>
+          <p:cNvPr id="151" name="Google Shape;151;p21"/>
+          <p:cNvSpPr txBox="1">
+            <a:spLocks noGrp="1"/>
+          </p:cNvSpPr>
+          <p:nvPr>
+            <p:ph type="body" idx="1"/>
+          </p:nvPr>
+        </p:nvSpPr>
+        <p:spPr>
+          <a:prstGeom prst="rect">
+            <a:avLst/>
+          </a:prstGeom>
+        </p:spPr>
+        <p:txBody>
+          <a:bodyPr spcFirstLastPara="1" wrap="square" lIns="91425" tIns="91425" rIns="91425" bIns="91425" anchor="t" anchorCtr="0">
+            <a:noAutofit/>
+          </a:bodyPr>
+          <a:lstStyle/>
+          <a:p>
+            <a:pPr marL="0" lvl="0" indent="0" algn="l" rtl="0">
+              <a:spcBef>
+                <a:spcPts val="600"/>
+              </a:spcBef>
+              <a:spcAft>
+                <a:spcPts val="0"/>
+              </a:spcAft>
+              <a:buNone/>
+            </a:pPr>
+            <a:r>
+              <a:rPr lang="en-US" sz="1200" dirty="0">
+                <a:hlinkClick r:id="rId3" action="ppaction://hlinkfile"/>
+              </a:rPr>
+              <a:t>Business Central Sandbox Image</a:t>
+            </a:r>
+            <a:endParaRPr lang="en-US" sz="1200" dirty="0"/>
+          </a:p>
+          <a:p>
+            <a:pPr marL="0" lvl="0" indent="0">
+              <a:buNone/>
+            </a:pPr>
+            <a:r>
+              <a:rPr lang="en-US" sz="1200" dirty="0">
+                <a:hlinkClick r:id="rId4" action="ppaction://hlinkfile"/>
+              </a:rPr>
+              <a:t>Business Central On Premise Image</a:t>
+            </a:r>
+            <a:endParaRPr lang="en-US" sz="1200" dirty="0"/>
+          </a:p>
+          <a:p>
+            <a:pPr marL="0" indent="0">
+              <a:buNone/>
+            </a:pPr>
+            <a:r>
+              <a:rPr lang="en-US" sz="1200" dirty="0">
+                <a:hlinkClick r:id="rId5"/>
+              </a:rPr>
+              <a:t>Docker Documentation</a:t>
+            </a:r>
+            <a:endParaRPr lang="en-US" sz="1200" dirty="0"/>
+          </a:p>
+          <a:p>
+            <a:pPr marL="0" indent="0">
+              <a:buNone/>
+            </a:pPr>
+            <a:r>
+              <a:rPr lang="en-US" sz="1200" dirty="0">
+                <a:hlinkClick r:id="rId6"/>
+              </a:rPr>
+              <a:t>Docker Hub Organization for </a:t>
+            </a:r>
+            <a:r>
+              <a:rPr lang="en-US" sz="1200">
+                <a:hlinkClick r:id="rId6"/>
+              </a:rPr>
+              <a:t>Netcompany ERP</a:t>
+            </a:r>
+            <a:endParaRPr lang="en-US" sz="1200" dirty="0"/>
+          </a:p>
+          <a:p>
+            <a:pPr marL="0" lvl="0" indent="0">
+              <a:buNone/>
+            </a:pPr>
+            <a:r>
+              <a:rPr lang="da-DK" sz="1200" dirty="0">
+                <a:hlinkClick r:id="rId7"/>
+              </a:rPr>
+              <a:t>GitHub for NAV/BC Images</a:t>
+            </a:r>
+            <a:endParaRPr lang="da-DK" sz="1200" dirty="0"/>
+          </a:p>
+          <a:p>
+            <a:pPr marL="0" lvl="0" indent="0">
+              <a:buNone/>
+            </a:pPr>
+            <a:r>
+              <a:rPr lang="da-DK" sz="1200" dirty="0">
+                <a:hlinkClick r:id="rId8"/>
+              </a:rPr>
+              <a:t>GitHub for </a:t>
+            </a:r>
+            <a:r>
+              <a:rPr lang="da-DK" sz="1200" dirty="0" err="1">
+                <a:hlinkClick r:id="rId8"/>
+              </a:rPr>
+              <a:t>NavContainerHelper</a:t>
+            </a:r>
+            <a:endParaRPr lang="da-DK" sz="1200" dirty="0"/>
+          </a:p>
+          <a:p>
+            <a:pPr marL="0" lvl="0" indent="0" algn="l" rtl="0">
+              <a:spcBef>
+                <a:spcPts val="600"/>
+              </a:spcBef>
+              <a:spcAft>
+                <a:spcPts val="0"/>
+              </a:spcAft>
+              <a:buNone/>
+            </a:pPr>
+            <a:r>
+              <a:rPr lang="en-US" sz="1200" dirty="0">
+                <a:hlinkClick r:id="rId9"/>
+              </a:rPr>
+              <a:t>Hyper-V vs. Process Isolation</a:t>
+            </a:r>
+            <a:endParaRPr lang="en-US" sz="1200" dirty="0"/>
+          </a:p>
+          <a:p>
+            <a:pPr marL="0" lvl="0" indent="0" algn="l" rtl="0">
+              <a:spcBef>
+                <a:spcPts val="600"/>
+              </a:spcBef>
+              <a:spcAft>
+                <a:spcPts val="0"/>
+              </a:spcAft>
+              <a:buNone/>
+            </a:pPr>
+            <a:r>
+              <a:rPr lang="en-US" sz="1200" dirty="0">
+                <a:hlinkClick r:id="rId10"/>
+              </a:rPr>
+              <a:t>Introduction to Business Central on Docker</a:t>
+            </a:r>
+            <a:endParaRPr lang="en-US" sz="1200" dirty="0"/>
+          </a:p>
+          <a:p>
+            <a:pPr marL="0" indent="0">
+              <a:buNone/>
+            </a:pPr>
+            <a:r>
+              <a:rPr lang="en-US" sz="1200" dirty="0">
+                <a:hlinkClick r:id="rId11"/>
+              </a:rPr>
+              <a:t>Introduction Video to Business Central on Docker</a:t>
+            </a:r>
+            <a:endParaRPr lang="en-US" sz="1200" dirty="0"/>
+          </a:p>
+          <a:p>
+            <a:pPr marL="0" lvl="0" indent="0">
+              <a:buNone/>
+            </a:pPr>
+            <a:r>
+              <a:rPr lang="en-US" sz="1200" dirty="0">
+                <a:hlinkClick r:id="rId12"/>
+              </a:rPr>
+              <a:t>List of Available BC Sandbox Versions</a:t>
+            </a:r>
+            <a:endParaRPr lang="en-US" sz="1200" dirty="0"/>
+          </a:p>
+          <a:p>
+            <a:pPr marL="0" lvl="0" indent="0">
+              <a:buNone/>
+            </a:pPr>
+            <a:r>
+              <a:rPr lang="en-US" sz="1200" dirty="0">
+                <a:hlinkClick r:id="rId13"/>
+              </a:rPr>
+              <a:t>List of Available BC On-Premises Versions</a:t>
+            </a:r>
+            <a:endParaRPr lang="en-US" sz="1200" dirty="0"/>
+          </a:p>
+          <a:p>
+            <a:pPr marL="0" indent="0">
+              <a:buNone/>
+            </a:pPr>
+            <a:r>
+              <a:rPr lang="en-US" sz="1200" dirty="0">
+                <a:hlinkClick r:id="rId14"/>
+              </a:rPr>
+              <a:t>Microsoft Learn – Learning Path for Azure Container Instances</a:t>
+            </a:r>
+            <a:endParaRPr lang="en-US" sz="1200" dirty="0"/>
+          </a:p>
+          <a:p>
+            <a:pPr marL="0" lvl="0" indent="0" algn="l" rtl="0">
+              <a:spcBef>
+                <a:spcPts val="600"/>
+              </a:spcBef>
+              <a:spcAft>
+                <a:spcPts val="0"/>
+              </a:spcAft>
+              <a:buNone/>
+            </a:pPr>
+            <a:r>
+              <a:rPr lang="en-US" sz="1200" dirty="0">
+                <a:hlinkClick r:id="rId15"/>
+              </a:rPr>
+              <a:t>Updates on </a:t>
+            </a:r>
+            <a:r>
+              <a:rPr lang="en-US" sz="1200" dirty="0" err="1">
+                <a:hlinkClick r:id="rId15"/>
+              </a:rPr>
+              <a:t>NavContainerHelper</a:t>
+            </a:r>
+            <a:endParaRPr lang="en-US" sz="1200" dirty="0"/>
+          </a:p>
+        </p:txBody>
+      </p:sp>
+      <p:sp>
+        <p:nvSpPr>
+          <p:cNvPr id="156" name="Google Shape;156;p21"/>
+          <p:cNvSpPr txBox="1">
+            <a:spLocks noGrp="1"/>
+          </p:cNvSpPr>
+          <p:nvPr>
+            <p:ph type="sldNum" idx="12"/>
+          </p:nvPr>
+        </p:nvSpPr>
+        <p:spPr>
+          <a:prstGeom prst="rect">
+            <a:avLst/>
+          </a:prstGeom>
+        </p:spPr>
+        <p:txBody>
+          <a:bodyPr spcFirstLastPara="1" wrap="square" lIns="91425" tIns="91425" rIns="91425" bIns="91425" anchor="t" anchorCtr="0">
+            <a:noAutofit/>
+          </a:bodyPr>
+          <a:lstStyle/>
+          <a:p>
+            <a:pPr marL="0" lvl="0" indent="0" algn="r" rtl="0">
+              <a:spcBef>
+                <a:spcPts val="0"/>
+              </a:spcBef>
+              <a:spcAft>
+                <a:spcPts val="0"/>
+              </a:spcAft>
+              <a:buNone/>
+            </a:pPr>
+            <a:fld id="{00000000-1234-1234-1234-123412341234}" type="slidenum">
+              <a:rPr lang="en"/>
+              <a:t>110</a:t>
+            </a:fld>
+            <a:endParaRPr/>
+          </a:p>
+        </p:txBody>
+      </p:sp>
+    </p:spTree>
+    <p:extLst>
+      <p:ext uri="{BB962C8B-B14F-4D97-AF65-F5344CB8AC3E}">
+        <p14:creationId xmlns:p14="http://schemas.microsoft.com/office/powerpoint/2010/main" val="4124776094"/>
       </p:ext>
     </p:extLst>
   </p:cSld>
@@ -20960,6 +22610,343 @@
   <p:clrMapOvr>
     <a:masterClrMapping/>
   </p:clrMapOvr>
+  <p:timing>
+    <p:tnLst>
+      <p:par>
+        <p:cTn id="1" dur="indefinite" restart="never" nodeType="tmRoot">
+          <p:childTnLst>
+            <p:seq concurrent="1" nextAc="seek">
+              <p:cTn id="2" dur="indefinite" nodeType="mainSeq">
+                <p:childTnLst>
+                  <p:par>
+                    <p:cTn id="3" fill="hold">
+                      <p:stCondLst>
+                        <p:cond delay="indefinite"/>
+                      </p:stCondLst>
+                      <p:childTnLst>
+                        <p:par>
+                          <p:cTn id="4" fill="hold">
+                            <p:stCondLst>
+                              <p:cond delay="0"/>
+                            </p:stCondLst>
+                            <p:childTnLst>
+                              <p:par>
+                                <p:cTn id="5" presetID="1" presetClass="entr" presetSubtype="0" fill="hold" nodeType="clickEffect">
+                                  <p:stCondLst>
+                                    <p:cond delay="0"/>
+                                  </p:stCondLst>
+                                  <p:childTnLst>
+                                    <p:set>
+                                      <p:cBhvr>
+                                        <p:cTn id="6" dur="1" fill="hold">
+                                          <p:stCondLst>
+                                            <p:cond delay="0"/>
+                                          </p:stCondLst>
+                                        </p:cTn>
+                                        <p:tgtEl>
+                                          <p:spTgt spid="151">
+                                            <p:txEl>
+                                              <p:pRg st="0" end="0"/>
+                                            </p:txEl>
+                                          </p:spTgt>
+                                        </p:tgtEl>
+                                        <p:attrNameLst>
+                                          <p:attrName>style.visibility</p:attrName>
+                                        </p:attrNameLst>
+                                      </p:cBhvr>
+                                      <p:to>
+                                        <p:strVal val="visible"/>
+                                      </p:to>
+                                    </p:set>
+                                  </p:childTnLst>
+                                </p:cTn>
+                              </p:par>
+                            </p:childTnLst>
+                          </p:cTn>
+                        </p:par>
+                      </p:childTnLst>
+                    </p:cTn>
+                  </p:par>
+                  <p:par>
+                    <p:cTn id="7" fill="hold">
+                      <p:stCondLst>
+                        <p:cond delay="indefinite"/>
+                      </p:stCondLst>
+                      <p:childTnLst>
+                        <p:par>
+                          <p:cTn id="8" fill="hold">
+                            <p:stCondLst>
+                              <p:cond delay="0"/>
+                            </p:stCondLst>
+                            <p:childTnLst>
+                              <p:par>
+                                <p:cTn id="9" presetID="1" presetClass="entr" presetSubtype="0" fill="hold" nodeType="clickEffect">
+                                  <p:stCondLst>
+                                    <p:cond delay="0"/>
+                                  </p:stCondLst>
+                                  <p:childTnLst>
+                                    <p:set>
+                                      <p:cBhvr>
+                                        <p:cTn id="10" dur="1" fill="hold">
+                                          <p:stCondLst>
+                                            <p:cond delay="0"/>
+                                          </p:stCondLst>
+                                        </p:cTn>
+                                        <p:tgtEl>
+                                          <p:spTgt spid="151">
+                                            <p:txEl>
+                                              <p:pRg st="2" end="2"/>
+                                            </p:txEl>
+                                          </p:spTgt>
+                                        </p:tgtEl>
+                                        <p:attrNameLst>
+                                          <p:attrName>style.visibility</p:attrName>
+                                        </p:attrNameLst>
+                                      </p:cBhvr>
+                                      <p:to>
+                                        <p:strVal val="visible"/>
+                                      </p:to>
+                                    </p:set>
+                                  </p:childTnLst>
+                                </p:cTn>
+                              </p:par>
+                              <p:par>
+                                <p:cTn id="11" presetID="1" presetClass="entr" presetSubtype="0" fill="hold" nodeType="withEffect">
+                                  <p:stCondLst>
+                                    <p:cond delay="0"/>
+                                  </p:stCondLst>
+                                  <p:childTnLst>
+                                    <p:set>
+                                      <p:cBhvr>
+                                        <p:cTn id="12" dur="1" fill="hold">
+                                          <p:stCondLst>
+                                            <p:cond delay="0"/>
+                                          </p:stCondLst>
+                                        </p:cTn>
+                                        <p:tgtEl>
+                                          <p:spTgt spid="151">
+                                            <p:txEl>
+                                              <p:pRg st="3" end="3"/>
+                                            </p:txEl>
+                                          </p:spTgt>
+                                        </p:tgtEl>
+                                        <p:attrNameLst>
+                                          <p:attrName>style.visibility</p:attrName>
+                                        </p:attrNameLst>
+                                      </p:cBhvr>
+                                      <p:to>
+                                        <p:strVal val="visible"/>
+                                      </p:to>
+                                    </p:set>
+                                  </p:childTnLst>
+                                </p:cTn>
+                              </p:par>
+                              <p:par>
+                                <p:cTn id="13" presetID="1" presetClass="entr" presetSubtype="0" fill="hold" nodeType="withEffect">
+                                  <p:stCondLst>
+                                    <p:cond delay="0"/>
+                                  </p:stCondLst>
+                                  <p:childTnLst>
+                                    <p:set>
+                                      <p:cBhvr>
+                                        <p:cTn id="14" dur="1" fill="hold">
+                                          <p:stCondLst>
+                                            <p:cond delay="0"/>
+                                          </p:stCondLst>
+                                        </p:cTn>
+                                        <p:tgtEl>
+                                          <p:spTgt spid="151">
+                                            <p:txEl>
+                                              <p:pRg st="4" end="4"/>
+                                            </p:txEl>
+                                          </p:spTgt>
+                                        </p:tgtEl>
+                                        <p:attrNameLst>
+                                          <p:attrName>style.visibility</p:attrName>
+                                        </p:attrNameLst>
+                                      </p:cBhvr>
+                                      <p:to>
+                                        <p:strVal val="visible"/>
+                                      </p:to>
+                                    </p:set>
+                                  </p:childTnLst>
+                                </p:cTn>
+                              </p:par>
+                            </p:childTnLst>
+                          </p:cTn>
+                        </p:par>
+                      </p:childTnLst>
+                    </p:cTn>
+                  </p:par>
+                  <p:par>
+                    <p:cTn id="15" fill="hold">
+                      <p:stCondLst>
+                        <p:cond delay="indefinite"/>
+                      </p:stCondLst>
+                      <p:childTnLst>
+                        <p:par>
+                          <p:cTn id="16" fill="hold">
+                            <p:stCondLst>
+                              <p:cond delay="0"/>
+                            </p:stCondLst>
+                            <p:childTnLst>
+                              <p:par>
+                                <p:cTn id="17" presetID="1" presetClass="entr" presetSubtype="0" fill="hold" nodeType="clickEffect">
+                                  <p:stCondLst>
+                                    <p:cond delay="0"/>
+                                  </p:stCondLst>
+                                  <p:childTnLst>
+                                    <p:set>
+                                      <p:cBhvr>
+                                        <p:cTn id="18" dur="1" fill="hold">
+                                          <p:stCondLst>
+                                            <p:cond delay="0"/>
+                                          </p:stCondLst>
+                                        </p:cTn>
+                                        <p:tgtEl>
+                                          <p:spTgt spid="151">
+                                            <p:txEl>
+                                              <p:pRg st="6" end="6"/>
+                                            </p:txEl>
+                                          </p:spTgt>
+                                        </p:tgtEl>
+                                        <p:attrNameLst>
+                                          <p:attrName>style.visibility</p:attrName>
+                                        </p:attrNameLst>
+                                      </p:cBhvr>
+                                      <p:to>
+                                        <p:strVal val="visible"/>
+                                      </p:to>
+                                    </p:set>
+                                  </p:childTnLst>
+                                </p:cTn>
+                              </p:par>
+                            </p:childTnLst>
+                          </p:cTn>
+                        </p:par>
+                      </p:childTnLst>
+                    </p:cTn>
+                  </p:par>
+                  <p:par>
+                    <p:cTn id="19" fill="hold">
+                      <p:stCondLst>
+                        <p:cond delay="indefinite"/>
+                      </p:stCondLst>
+                      <p:childTnLst>
+                        <p:par>
+                          <p:cTn id="20" fill="hold">
+                            <p:stCondLst>
+                              <p:cond delay="0"/>
+                            </p:stCondLst>
+                            <p:childTnLst>
+                              <p:par>
+                                <p:cTn id="21" presetID="1" presetClass="entr" presetSubtype="0" fill="hold" nodeType="clickEffect">
+                                  <p:stCondLst>
+                                    <p:cond delay="0"/>
+                                  </p:stCondLst>
+                                  <p:childTnLst>
+                                    <p:set>
+                                      <p:cBhvr>
+                                        <p:cTn id="22" dur="1" fill="hold">
+                                          <p:stCondLst>
+                                            <p:cond delay="0"/>
+                                          </p:stCondLst>
+                                        </p:cTn>
+                                        <p:tgtEl>
+                                          <p:spTgt spid="151">
+                                            <p:txEl>
+                                              <p:pRg st="8" end="8"/>
+                                            </p:txEl>
+                                          </p:spTgt>
+                                        </p:tgtEl>
+                                        <p:attrNameLst>
+                                          <p:attrName>style.visibility</p:attrName>
+                                        </p:attrNameLst>
+                                      </p:cBhvr>
+                                      <p:to>
+                                        <p:strVal val="visible"/>
+                                      </p:to>
+                                    </p:set>
+                                  </p:childTnLst>
+                                </p:cTn>
+                              </p:par>
+                            </p:childTnLst>
+                          </p:cTn>
+                        </p:par>
+                      </p:childTnLst>
+                    </p:cTn>
+                  </p:par>
+                  <p:par>
+                    <p:cTn id="23" fill="hold">
+                      <p:stCondLst>
+                        <p:cond delay="indefinite"/>
+                      </p:stCondLst>
+                      <p:childTnLst>
+                        <p:par>
+                          <p:cTn id="24" fill="hold">
+                            <p:stCondLst>
+                              <p:cond delay="0"/>
+                            </p:stCondLst>
+                            <p:childTnLst>
+                              <p:par>
+                                <p:cTn id="25" presetID="1" presetClass="entr" presetSubtype="0" fill="hold" nodeType="clickEffect">
+                                  <p:stCondLst>
+                                    <p:cond delay="0"/>
+                                  </p:stCondLst>
+                                  <p:childTnLst>
+                                    <p:set>
+                                      <p:cBhvr>
+                                        <p:cTn id="26" dur="1" fill="hold">
+                                          <p:stCondLst>
+                                            <p:cond delay="0"/>
+                                          </p:stCondLst>
+                                        </p:cTn>
+                                        <p:tgtEl>
+                                          <p:spTgt spid="151">
+                                            <p:txEl>
+                                              <p:pRg st="10" end="10"/>
+                                            </p:txEl>
+                                          </p:spTgt>
+                                        </p:tgtEl>
+                                        <p:attrNameLst>
+                                          <p:attrName>style.visibility</p:attrName>
+                                        </p:attrNameLst>
+                                      </p:cBhvr>
+                                      <p:to>
+                                        <p:strVal val="visible"/>
+                                      </p:to>
+                                    </p:set>
+                                  </p:childTnLst>
+                                </p:cTn>
+                              </p:par>
+                            </p:childTnLst>
+                          </p:cTn>
+                        </p:par>
+                      </p:childTnLst>
+                    </p:cTn>
+                  </p:par>
+                </p:childTnLst>
+              </p:cTn>
+              <p:prevCondLst>
+                <p:cond evt="onPrev" delay="0">
+                  <p:tgtEl>
+                    <p:sldTgt/>
+                  </p:tgtEl>
+                </p:cond>
+              </p:prevCondLst>
+              <p:nextCondLst>
+                <p:cond evt="onNext" delay="0">
+                  <p:tgtEl>
+                    <p:sldTgt/>
+                  </p:tgtEl>
+                </p:cond>
+              </p:nextCondLst>
+            </p:seq>
+          </p:childTnLst>
+        </p:cTn>
+      </p:par>
+    </p:tnLst>
+  </p:timing>
 </p:sld>
 </file>
 

</xml_diff>

<commit_message>
Updates to slides and removal of license file.
</commit_message>
<xml_diff>
--- a/Business Central on a Docker Image.pptx
+++ b/Business Central on a Docker Image.pptx
@@ -1024,93 +1024,6 @@
             <a:pPr marL="38100" indent="0">
               <a:buNone/>
             </a:pPr>
-            <a:r>
-              <a:rPr lang="da-DK" dirty="0" err="1"/>
-              <a:t>Relatively</a:t>
-            </a:r>
-            <a:r>
-              <a:rPr lang="da-DK" dirty="0"/>
-              <a:t> </a:t>
-            </a:r>
-            <a:r>
-              <a:rPr lang="da-DK" dirty="0" err="1"/>
-              <a:t>isolated</a:t>
-            </a:r>
-            <a:r>
-              <a:rPr lang="da-DK" dirty="0"/>
-              <a:t> (</a:t>
-            </a:r>
-            <a:r>
-              <a:rPr lang="da-DK" dirty="0" err="1"/>
-              <a:t>e.g</a:t>
-            </a:r>
-            <a:r>
-              <a:rPr lang="da-DK" dirty="0"/>
-              <a:t>. from </a:t>
-            </a:r>
-            <a:r>
-              <a:rPr lang="da-DK" dirty="0" err="1"/>
-              <a:t>other</a:t>
-            </a:r>
-            <a:r>
-              <a:rPr lang="da-DK" dirty="0"/>
-              <a:t> apps on the host computer </a:t>
-            </a:r>
-            <a:r>
-              <a:rPr lang="da-DK" dirty="0" err="1"/>
-              <a:t>unless</a:t>
-            </a:r>
-            <a:r>
-              <a:rPr lang="da-DK" dirty="0"/>
-              <a:t> </a:t>
-            </a:r>
-            <a:r>
-              <a:rPr lang="da-DK" dirty="0" err="1"/>
-              <a:t>configured</a:t>
-            </a:r>
-            <a:r>
-              <a:rPr lang="da-DK" dirty="0"/>
-              <a:t> to do so)</a:t>
-            </a:r>
-          </a:p>
-          <a:p>
-            <a:pPr marL="38100" indent="0">
-              <a:buNone/>
-            </a:pPr>
-            <a:endParaRPr lang="da-DK" dirty="0"/>
-          </a:p>
-          <a:p>
-            <a:pPr marL="38100" indent="0">
-              <a:buNone/>
-            </a:pPr>
-            <a:r>
-              <a:rPr lang="da-DK" dirty="0" err="1"/>
-              <a:t>Less</a:t>
-            </a:r>
-            <a:r>
-              <a:rPr lang="da-DK" dirty="0"/>
-              <a:t> </a:t>
-            </a:r>
-            <a:r>
-              <a:rPr lang="da-DK" dirty="0" err="1"/>
-              <a:t>isolated</a:t>
-            </a:r>
-            <a:r>
-              <a:rPr lang="da-DK" dirty="0"/>
-              <a:t> </a:t>
-            </a:r>
-            <a:r>
-              <a:rPr lang="da-DK" dirty="0" err="1"/>
-              <a:t>than</a:t>
-            </a:r>
-            <a:r>
-              <a:rPr lang="da-DK" dirty="0"/>
-              <a:t> virtual </a:t>
-            </a:r>
-            <a:r>
-              <a:rPr lang="da-DK" dirty="0" err="1"/>
-              <a:t>machines</a:t>
-            </a:r>
             <a:endParaRPr lang="da-DK" dirty="0"/>
           </a:p>
         </p:txBody>
@@ -2841,109 +2754,6 @@
           </a:bodyPr>
           <a:lstStyle/>
           <a:p>
-            <a:pPr marL="38100" indent="0">
-              <a:buNone/>
-            </a:pPr>
-            <a:r>
-              <a:rPr lang="da-DK" sz="1100" dirty="0"/>
-              <a:t>A </a:t>
-            </a:r>
-            <a:r>
-              <a:rPr lang="da-DK" sz="1100" dirty="0" err="1"/>
-              <a:t>containerized</a:t>
-            </a:r>
-            <a:r>
-              <a:rPr lang="da-DK" sz="1100" dirty="0"/>
-              <a:t>/</a:t>
-            </a:r>
-            <a:r>
-              <a:rPr lang="da-DK" sz="1100" dirty="0" err="1"/>
-              <a:t>dockerized</a:t>
-            </a:r>
-            <a:r>
-              <a:rPr lang="da-DK" sz="1100" dirty="0"/>
-              <a:t> app is </a:t>
-            </a:r>
-            <a:r>
-              <a:rPr lang="da-DK" sz="1100" dirty="0" err="1"/>
-              <a:t>created</a:t>
-            </a:r>
-            <a:r>
-              <a:rPr lang="da-DK" sz="1100" dirty="0"/>
-              <a:t> by </a:t>
-            </a:r>
-            <a:r>
-              <a:rPr lang="da-DK" sz="1100" dirty="0" err="1"/>
-              <a:t>building</a:t>
-            </a:r>
-            <a:r>
-              <a:rPr lang="da-DK" sz="1100" dirty="0"/>
-              <a:t> a Docker Image</a:t>
-            </a:r>
-          </a:p>
-          <a:p>
-            <a:pPr marL="38100" indent="0">
-              <a:buNone/>
-            </a:pPr>
-            <a:endParaRPr lang="da-DK" sz="1100" dirty="0"/>
-          </a:p>
-          <a:p>
-            <a:pPr marL="38100" indent="0">
-              <a:buNone/>
-            </a:pPr>
-            <a:r>
-              <a:rPr lang="da-DK" sz="1100" dirty="0"/>
-              <a:t>Set of files and a </a:t>
-            </a:r>
-            <a:r>
-              <a:rPr lang="da-DK" sz="1100" dirty="0" err="1"/>
-              <a:t>block</a:t>
-            </a:r>
-            <a:r>
-              <a:rPr lang="da-DK" sz="1100" dirty="0"/>
-              <a:t> of </a:t>
-            </a:r>
-            <a:r>
-              <a:rPr lang="da-DK" sz="1100" dirty="0" err="1"/>
-              <a:t>configuration</a:t>
-            </a:r>
-            <a:r>
-              <a:rPr lang="da-DK" sz="1100" dirty="0"/>
-              <a:t> </a:t>
-            </a:r>
-            <a:r>
-              <a:rPr lang="da-DK" sz="1100" dirty="0" err="1"/>
-              <a:t>used</a:t>
-            </a:r>
-            <a:r>
-              <a:rPr lang="da-DK" sz="1100" dirty="0"/>
-              <a:t> by Docker</a:t>
-            </a:r>
-          </a:p>
-          <a:p>
-            <a:pPr marL="38100" indent="0">
-              <a:buNone/>
-            </a:pPr>
-            <a:endParaRPr lang="da-DK" sz="1100" dirty="0"/>
-          </a:p>
-          <a:p>
-            <a:pPr marL="38100" indent="0">
-              <a:buNone/>
-            </a:pPr>
-            <a:r>
-              <a:rPr lang="da-DK" sz="1100" dirty="0"/>
-              <a:t>Can </a:t>
-            </a:r>
-            <a:r>
-              <a:rPr lang="da-DK" sz="1100" dirty="0" err="1"/>
-              <a:t>be</a:t>
-            </a:r>
-            <a:r>
-              <a:rPr lang="da-DK" sz="1100" dirty="0"/>
-              <a:t> run on desktop, on server or in the cloud</a:t>
-            </a:r>
-          </a:p>
-          <a:p>
             <a:pPr marL="0" lvl="0" indent="0" algn="l" rtl="0">
               <a:spcBef>
                 <a:spcPts val="0"/>
@@ -4365,78 +4175,6 @@
               </a:spcAft>
               <a:buNone/>
             </a:pPr>
-            <a:r>
-              <a:rPr lang="da-DK" dirty="0" err="1"/>
-              <a:t>We</a:t>
-            </a:r>
-            <a:r>
-              <a:rPr lang="da-DK" dirty="0"/>
-              <a:t> </a:t>
-            </a:r>
-            <a:r>
-              <a:rPr lang="da-DK" dirty="0" err="1"/>
-              <a:t>will</a:t>
-            </a:r>
-            <a:r>
-              <a:rPr lang="da-DK" dirty="0"/>
-              <a:t> </a:t>
-            </a:r>
-            <a:r>
-              <a:rPr lang="da-DK" dirty="0" err="1"/>
-              <a:t>use</a:t>
-            </a:r>
-            <a:r>
-              <a:rPr lang="da-DK" dirty="0"/>
-              <a:t>  </a:t>
-            </a:r>
-            <a:r>
-              <a:rPr lang="da-DK" dirty="0" err="1"/>
-              <a:t>volumes</a:t>
-            </a:r>
-            <a:r>
-              <a:rPr lang="da-DK" dirty="0"/>
-              <a:t> </a:t>
-            </a:r>
-            <a:r>
-              <a:rPr lang="da-DK" dirty="0" err="1"/>
-              <a:t>later</a:t>
-            </a:r>
-            <a:r>
-              <a:rPr lang="da-DK" dirty="0"/>
-              <a:t> to </a:t>
-            </a:r>
-            <a:r>
-              <a:rPr lang="da-DK" dirty="0" err="1"/>
-              <a:t>add</a:t>
-            </a:r>
-            <a:r>
-              <a:rPr lang="da-DK" dirty="0"/>
-              <a:t> </a:t>
-            </a:r>
-            <a:r>
-              <a:rPr lang="da-DK" dirty="0" err="1"/>
-              <a:t>custom</a:t>
-            </a:r>
-            <a:r>
-              <a:rPr lang="da-DK" dirty="0"/>
-              <a:t> scripts and </a:t>
-            </a:r>
-            <a:r>
-              <a:rPr lang="da-DK" dirty="0" err="1"/>
-              <a:t>other</a:t>
-            </a:r>
-            <a:r>
-              <a:rPr lang="da-DK" dirty="0"/>
-              <a:t> files to </a:t>
-            </a:r>
-            <a:r>
-              <a:rPr lang="da-DK" dirty="0" err="1"/>
-              <a:t>our</a:t>
-            </a:r>
-            <a:r>
-              <a:rPr lang="da-DK" dirty="0"/>
-              <a:t> Business Central container.</a:t>
-            </a:r>
             <a:endParaRPr dirty="0"/>
           </a:p>
         </p:txBody>
@@ -4764,225 +4502,6 @@
               </a:spcAft>
               <a:buNone/>
             </a:pPr>
-            <a:r>
-              <a:rPr lang="da-DK" dirty="0"/>
-              <a:t>Slides </a:t>
-            </a:r>
-            <a:r>
-              <a:rPr lang="da-DK" dirty="0" err="1"/>
-              <a:t>can</a:t>
-            </a:r>
-            <a:r>
-              <a:rPr lang="da-DK" dirty="0"/>
-              <a:t> </a:t>
-            </a:r>
-            <a:r>
-              <a:rPr lang="da-DK" dirty="0" err="1"/>
-              <a:t>be</a:t>
-            </a:r>
-            <a:r>
-              <a:rPr lang="da-DK" dirty="0"/>
-              <a:t> </a:t>
-            </a:r>
-            <a:r>
-              <a:rPr lang="da-DK" dirty="0" err="1"/>
-              <a:t>used</a:t>
-            </a:r>
-            <a:r>
-              <a:rPr lang="da-DK" dirty="0"/>
-              <a:t> as a reference </a:t>
-            </a:r>
-            <a:r>
-              <a:rPr lang="da-DK" dirty="0" err="1"/>
-              <a:t>work</a:t>
-            </a:r>
-            <a:r>
-              <a:rPr lang="da-DK" dirty="0"/>
-              <a:t>. It </a:t>
-            </a:r>
-            <a:r>
-              <a:rPr lang="da-DK" dirty="0" err="1"/>
-              <a:t>will</a:t>
-            </a:r>
-            <a:r>
-              <a:rPr lang="da-DK" dirty="0"/>
-              <a:t> </a:t>
-            </a:r>
-            <a:r>
-              <a:rPr lang="da-DK" dirty="0" err="1"/>
-              <a:t>be</a:t>
-            </a:r>
-            <a:r>
-              <a:rPr lang="da-DK" dirty="0"/>
-              <a:t> </a:t>
-            </a:r>
-            <a:r>
-              <a:rPr lang="da-DK" dirty="0" err="1"/>
-              <a:t>uploaded</a:t>
-            </a:r>
-            <a:r>
-              <a:rPr lang="da-DK" dirty="0"/>
-              <a:t> </a:t>
-            </a:r>
-            <a:r>
-              <a:rPr lang="da-DK" dirty="0" err="1"/>
-              <a:t>alongside</a:t>
-            </a:r>
-            <a:r>
-              <a:rPr lang="da-DK" dirty="0"/>
-              <a:t> som </a:t>
-            </a:r>
-            <a:r>
-              <a:rPr lang="da-DK" dirty="0" err="1"/>
-              <a:t>example</a:t>
-            </a:r>
-            <a:r>
-              <a:rPr lang="da-DK" dirty="0"/>
-              <a:t> scripts to </a:t>
-            </a:r>
-            <a:r>
-              <a:rPr lang="da-DK" dirty="0" err="1"/>
-              <a:t>get</a:t>
-            </a:r>
-            <a:r>
-              <a:rPr lang="da-DK" dirty="0"/>
-              <a:t> </a:t>
-            </a:r>
-            <a:r>
-              <a:rPr lang="da-DK" dirty="0" err="1"/>
-              <a:t>started</a:t>
-            </a:r>
-            <a:r>
-              <a:rPr lang="da-DK" dirty="0"/>
-              <a:t>.</a:t>
-            </a:r>
-          </a:p>
-          <a:p>
-            <a:pPr marL="0" lvl="0" indent="0" algn="l" rtl="0">
-              <a:spcBef>
-                <a:spcPts val="0"/>
-              </a:spcBef>
-              <a:spcAft>
-                <a:spcPts val="0"/>
-              </a:spcAft>
-              <a:buNone/>
-            </a:pPr>
-            <a:r>
-              <a:rPr lang="da-DK" dirty="0"/>
-              <a:t>Will skip </a:t>
-            </a:r>
-            <a:r>
-              <a:rPr lang="da-DK" dirty="0" err="1"/>
-              <a:t>through</a:t>
-            </a:r>
-            <a:r>
-              <a:rPr lang="da-DK" dirty="0"/>
-              <a:t> </a:t>
-            </a:r>
-            <a:r>
-              <a:rPr lang="da-DK" dirty="0" err="1"/>
-              <a:t>some</a:t>
-            </a:r>
-            <a:r>
-              <a:rPr lang="da-DK" dirty="0"/>
-              <a:t> </a:t>
-            </a:r>
-            <a:r>
-              <a:rPr lang="da-DK" dirty="0" err="1"/>
-              <a:t>sections</a:t>
-            </a:r>
-            <a:r>
-              <a:rPr lang="da-DK" dirty="0"/>
-              <a:t> </a:t>
-            </a:r>
-            <a:r>
-              <a:rPr lang="da-DK" dirty="0" err="1"/>
-              <a:t>rather</a:t>
-            </a:r>
-            <a:r>
-              <a:rPr lang="da-DK" dirty="0"/>
-              <a:t> </a:t>
-            </a:r>
-            <a:r>
-              <a:rPr lang="da-DK" dirty="0" err="1"/>
-              <a:t>quickly</a:t>
-            </a:r>
-            <a:r>
-              <a:rPr lang="da-DK" dirty="0"/>
-              <a:t> </a:t>
-            </a:r>
-            <a:r>
-              <a:rPr lang="da-DK" dirty="0" err="1"/>
-              <a:t>because</a:t>
-            </a:r>
-            <a:r>
-              <a:rPr lang="da-DK" dirty="0"/>
-              <a:t> </a:t>
-            </a:r>
-            <a:r>
-              <a:rPr lang="da-DK" dirty="0" err="1"/>
-              <a:t>you</a:t>
-            </a:r>
-            <a:r>
-              <a:rPr lang="da-DK" dirty="0"/>
-              <a:t> </a:t>
-            </a:r>
-            <a:r>
-              <a:rPr lang="da-DK" dirty="0" err="1"/>
-              <a:t>can</a:t>
-            </a:r>
-            <a:r>
-              <a:rPr lang="da-DK" dirty="0"/>
-              <a:t> </a:t>
-            </a:r>
-            <a:r>
-              <a:rPr lang="da-DK" dirty="0" err="1"/>
-              <a:t>try</a:t>
-            </a:r>
-            <a:r>
-              <a:rPr lang="da-DK" dirty="0"/>
-              <a:t> </a:t>
-            </a:r>
-            <a:r>
-              <a:rPr lang="da-DK" dirty="0" err="1"/>
-              <a:t>them</a:t>
-            </a:r>
-            <a:r>
-              <a:rPr lang="da-DK" dirty="0"/>
-              <a:t> with the Masterclass files or it </a:t>
-            </a:r>
-            <a:r>
-              <a:rPr lang="da-DK" dirty="0" err="1"/>
-              <a:t>won’t</a:t>
-            </a:r>
-            <a:r>
-              <a:rPr lang="da-DK" dirty="0"/>
-              <a:t> </a:t>
-            </a:r>
-            <a:r>
-              <a:rPr lang="da-DK" dirty="0" err="1"/>
-              <a:t>be</a:t>
-            </a:r>
-            <a:r>
-              <a:rPr lang="da-DK" dirty="0"/>
-              <a:t> </a:t>
-            </a:r>
-            <a:r>
-              <a:rPr lang="da-DK" dirty="0" err="1"/>
-              <a:t>used</a:t>
-            </a:r>
-            <a:r>
-              <a:rPr lang="da-DK" dirty="0"/>
-              <a:t> </a:t>
-            </a:r>
-            <a:r>
-              <a:rPr lang="da-DK" dirty="0" err="1"/>
-              <a:t>much</a:t>
-            </a:r>
-            <a:r>
-              <a:rPr lang="da-DK" dirty="0"/>
-              <a:t> with BC.</a:t>
-            </a:r>
             <a:endParaRPr dirty="0"/>
           </a:p>
         </p:txBody>
@@ -5201,114 +4720,6 @@
               </a:spcAft>
               <a:buNone/>
             </a:pPr>
-            <a:r>
-              <a:rPr lang="da-DK" dirty="0"/>
-              <a:t>Note </a:t>
-            </a:r>
-            <a:r>
-              <a:rPr lang="da-DK" dirty="0" err="1"/>
-              <a:t>that</a:t>
-            </a:r>
-            <a:r>
-              <a:rPr lang="da-DK" dirty="0"/>
-              <a:t> </a:t>
-            </a:r>
-            <a:r>
-              <a:rPr lang="da-DK" dirty="0" err="1"/>
-              <a:t>we</a:t>
-            </a:r>
-            <a:r>
-              <a:rPr lang="da-DK" dirty="0"/>
-              <a:t> </a:t>
-            </a:r>
-            <a:r>
-              <a:rPr lang="da-DK" dirty="0" err="1"/>
-              <a:t>may</a:t>
-            </a:r>
-            <a:r>
-              <a:rPr lang="da-DK" dirty="0"/>
-              <a:t> </a:t>
-            </a:r>
-            <a:r>
-              <a:rPr lang="da-DK" dirty="0" err="1"/>
-              <a:t>want</a:t>
-            </a:r>
-            <a:r>
-              <a:rPr lang="da-DK" dirty="0"/>
-              <a:t> to </a:t>
-            </a:r>
-            <a:r>
-              <a:rPr lang="da-DK" dirty="0" err="1"/>
-              <a:t>use</a:t>
-            </a:r>
-            <a:r>
-              <a:rPr lang="da-DK" dirty="0"/>
-              <a:t> ‘</a:t>
-            </a:r>
-            <a:r>
-              <a:rPr lang="da-DK" dirty="0" err="1"/>
-              <a:t>docker</a:t>
-            </a:r>
-            <a:r>
-              <a:rPr lang="da-DK" dirty="0"/>
-              <a:t> </a:t>
-            </a:r>
-            <a:r>
-              <a:rPr lang="da-DK" dirty="0" err="1"/>
-              <a:t>commit</a:t>
-            </a:r>
-            <a:r>
-              <a:rPr lang="da-DK" dirty="0"/>
-              <a:t>’ to </a:t>
-            </a:r>
-            <a:r>
-              <a:rPr lang="da-DK" dirty="0" err="1"/>
-              <a:t>create</a:t>
-            </a:r>
-            <a:r>
-              <a:rPr lang="da-DK" dirty="0"/>
-              <a:t> </a:t>
-            </a:r>
-            <a:r>
-              <a:rPr lang="da-DK" dirty="0" err="1"/>
-              <a:t>custom</a:t>
-            </a:r>
-            <a:r>
-              <a:rPr lang="da-DK" dirty="0"/>
-              <a:t> images, </a:t>
-            </a:r>
-            <a:r>
-              <a:rPr lang="da-DK" dirty="0" err="1"/>
-              <a:t>e.g</a:t>
-            </a:r>
-            <a:r>
-              <a:rPr lang="da-DK" dirty="0"/>
-              <a:t>. </a:t>
-            </a:r>
-            <a:r>
-              <a:rPr lang="da-DK" dirty="0" err="1"/>
-              <a:t>preloaded</a:t>
-            </a:r>
-            <a:r>
-              <a:rPr lang="da-DK" dirty="0"/>
-              <a:t> with </a:t>
-            </a:r>
-            <a:r>
-              <a:rPr lang="da-DK" dirty="0" err="1"/>
-              <a:t>certain</a:t>
-            </a:r>
-            <a:r>
-              <a:rPr lang="da-DK" dirty="0"/>
-              <a:t> </a:t>
-            </a:r>
-            <a:r>
-              <a:rPr lang="da-DK" dirty="0" err="1"/>
-              <a:t>functionality</a:t>
-            </a:r>
-            <a:r>
-              <a:rPr lang="da-DK" dirty="0"/>
-              <a:t>.</a:t>
-            </a:r>
             <a:endParaRPr dirty="0"/>
           </a:p>
         </p:txBody>
@@ -6284,40 +5695,7 @@
             <a:pPr marL="38100" indent="0">
               <a:buNone/>
             </a:pPr>
-            <a:r>
-              <a:rPr lang="en-US" sz="1100" dirty="0"/>
-              <a:t>We will potentially use Docker quite a lot in our daily activities.</a:t>
-            </a:r>
-          </a:p>
-          <a:p>
-            <a:pPr marL="38100" indent="0">
-              <a:buNone/>
-            </a:pPr>
             <a:endParaRPr lang="en-US" sz="1100" dirty="0"/>
-          </a:p>
-          <a:p>
-            <a:pPr marL="38100" indent="0">
-              <a:buNone/>
-            </a:pPr>
-            <a:r>
-              <a:rPr lang="en-US" sz="1100" dirty="0"/>
-              <a:t>Use cases are presented later but are not exhaustive.</a:t>
-            </a:r>
-          </a:p>
-          <a:p>
-            <a:pPr marL="38100" indent="0">
-              <a:buNone/>
-            </a:pPr>
-            <a:endParaRPr lang="en-US" sz="1100" dirty="0"/>
-          </a:p>
-          <a:p>
-            <a:pPr marL="38100" indent="0">
-              <a:buNone/>
-            </a:pPr>
-            <a:r>
-              <a:rPr lang="en-US" sz="1100" dirty="0"/>
-              <a:t>It is an open project and a topic to be explored further.</a:t>
-            </a:r>
           </a:p>
         </p:txBody>
       </p:sp>
@@ -6426,30 +5804,6 @@
               </a:spcAft>
               <a:buNone/>
             </a:pPr>
-            <a:r>
-              <a:rPr lang="da-DK" dirty="0"/>
-              <a:t>Links </a:t>
-            </a:r>
-            <a:r>
-              <a:rPr lang="da-DK" dirty="0" err="1"/>
-              <a:t>are</a:t>
-            </a:r>
-            <a:r>
-              <a:rPr lang="da-DK" dirty="0"/>
-              <a:t> </a:t>
-            </a:r>
-            <a:r>
-              <a:rPr lang="da-DK" dirty="0" err="1"/>
-              <a:t>repository</a:t>
-            </a:r>
-            <a:r>
-              <a:rPr lang="da-DK" dirty="0"/>
-              <a:t> </a:t>
-            </a:r>
-            <a:r>
-              <a:rPr lang="da-DK" dirty="0" err="1"/>
-              <a:t>URLs</a:t>
-            </a:r>
             <a:endParaRPr dirty="0"/>
           </a:p>
         </p:txBody>
@@ -7104,66 +6458,6 @@
               </a:spcAft>
               <a:buNone/>
             </a:pPr>
-            <a:r>
-              <a:rPr lang="da-DK" dirty="0"/>
-              <a:t>Help-</a:t>
-            </a:r>
-            <a:r>
-              <a:rPr lang="da-DK" dirty="0" err="1"/>
-              <a:t>function</a:t>
-            </a:r>
-            <a:r>
-              <a:rPr lang="da-DK" dirty="0"/>
-              <a:t> is </a:t>
-            </a:r>
-            <a:r>
-              <a:rPr lang="da-DK" dirty="0" err="1"/>
-              <a:t>particularly</a:t>
-            </a:r>
-            <a:r>
-              <a:rPr lang="da-DK" dirty="0"/>
-              <a:t> </a:t>
-            </a:r>
-            <a:r>
-              <a:rPr lang="da-DK" dirty="0" err="1"/>
-              <a:t>useful</a:t>
-            </a:r>
-            <a:r>
-              <a:rPr lang="da-DK" dirty="0"/>
-              <a:t> </a:t>
-            </a:r>
-            <a:r>
-              <a:rPr lang="da-DK" dirty="0" err="1"/>
-              <a:t>since</a:t>
-            </a:r>
-            <a:r>
-              <a:rPr lang="da-DK" dirty="0"/>
-              <a:t> </a:t>
-            </a:r>
-            <a:r>
-              <a:rPr lang="da-DK" dirty="0" err="1"/>
-              <a:t>documentation</a:t>
-            </a:r>
-            <a:r>
-              <a:rPr lang="da-DK" dirty="0"/>
-              <a:t> for </a:t>
-            </a:r>
-            <a:r>
-              <a:rPr lang="da-DK" dirty="0" err="1"/>
-              <a:t>NavContainerHelper</a:t>
-            </a:r>
-            <a:r>
-              <a:rPr lang="da-DK" dirty="0"/>
-              <a:t> is </a:t>
-            </a:r>
-            <a:r>
-              <a:rPr lang="da-DK" dirty="0" err="1"/>
-              <a:t>sparse</a:t>
-            </a:r>
-            <a:r>
-              <a:rPr lang="da-DK" dirty="0"/>
-              <a:t>.</a:t>
-            </a:r>
             <a:endParaRPr dirty="0"/>
           </a:p>
         </p:txBody>
@@ -46257,6 +45551,26 @@
               <a:t>Before getting started, clean up your solution as much as possible and move customizations to an event-based architecture where possible.</a:t>
             </a:r>
           </a:p>
+          <a:p>
+            <a:pPr marL="38100" indent="0">
+              <a:buNone/>
+            </a:pPr>
+            <a:endParaRPr lang="en-US" dirty="0"/>
+          </a:p>
+          <a:p>
+            <a:pPr marL="38100" indent="0">
+              <a:buNone/>
+            </a:pPr>
+            <a:r>
+              <a:rPr lang="en-US" dirty="0"/>
+              <a:t>The following process is demonstrated in the </a:t>
+            </a:r>
+            <a:r>
+              <a:rPr lang="en-US"/>
+              <a:t>Masterclass scripts.</a:t>
+            </a:r>
+            <a:endParaRPr lang="en-US" dirty="0"/>
+          </a:p>
         </p:txBody>
       </p:sp>
       <p:sp>

</xml_diff>